<commit_message>
edits part 1 081021
</commit_message>
<xml_diff>
--- a/docs/images/amazon-selling-partner-api-architecture-diagram.pptx
+++ b/docs/images/amazon-selling-partner-api-architecture-diagram.pptx
@@ -6,6 +6,8 @@
   </p:sldMasterIdLst>
   <p:sldIdLst>
     <p:sldId id="256" r:id="rId2"/>
+    <p:sldId id="257" r:id="rId3"/>
+    <p:sldId id="258" r:id="rId4"/>
   </p:sldIdLst>
   <p:sldSz cx="12192000" cy="6858000"/>
   <p:notesSz cx="6858000" cy="9144000"/>
@@ -3056,7 +3058,7 @@
           <a:blip r:embed="rId2">
             <a:extLst>
               <a:ext uri="{96DAC541-7B7A-43D3-8B79-37D633B846F1}">
-                <asvg:svgBlip xmlns="" xmlns:asvg="http://schemas.microsoft.com/office/drawing/2016/SVG/main" r:embed="rId7"/>
+                <asvg:svgBlip xmlns:asvg="http://schemas.microsoft.com/office/drawing/2016/SVG/main" xmlns="" r:embed="rId7"/>
               </a:ext>
             </a:extLst>
           </a:blip>
@@ -3102,7 +3104,7 @@
         </p:blipFill>
         <p:spPr bwMode="auto">
           <a:xfrm>
-            <a:off x="2721643" y="2647315"/>
+            <a:off x="2721643" y="2621914"/>
             <a:ext cx="762000" cy="762000"/>
           </a:xfrm>
           <a:prstGeom prst="rect">
@@ -3149,7 +3151,7 @@
         </p:nvSpPr>
         <p:spPr bwMode="auto">
           <a:xfrm>
-            <a:off x="1973931" y="3409315"/>
+            <a:off x="1973931" y="3383914"/>
             <a:ext cx="2279650" cy="276999"/>
           </a:xfrm>
           <a:prstGeom prst="rect">
@@ -3323,7 +3325,7 @@
         </p:blipFill>
         <p:spPr bwMode="auto">
           <a:xfrm>
-            <a:off x="5099053" y="1646287"/>
+            <a:off x="5099053" y="1639937"/>
             <a:ext cx="762000" cy="762000"/>
           </a:xfrm>
           <a:prstGeom prst="rect">
@@ -3765,7 +3767,7 @@
         </p:blipFill>
         <p:spPr bwMode="auto">
           <a:xfrm>
-            <a:off x="5099053" y="3582895"/>
+            <a:off x="5099053" y="3576545"/>
             <a:ext cx="762000" cy="762000"/>
           </a:xfrm>
           <a:prstGeom prst="rect">
@@ -4113,15 +4115,7 @@
                 <a:ea typeface="Amazon Ember" panose="020B0603020204020204" pitchFamily="34" charset="0"/>
                 <a:cs typeface="Arial" panose="020B0604020202020204" pitchFamily="34" charset="0"/>
               </a:rPr>
-              <a:t>Selling partner API </a:t>
-            </a:r>
-            <a:r>
-              <a:rPr lang="en-US" altLang="en-US" sz="1200" dirty="0" smtClean="0">
-                <a:latin typeface="Arial" panose="020B0604020202020204" pitchFamily="34" charset="0"/>
-                <a:ea typeface="Amazon Ember" panose="020B0603020204020204" pitchFamily="34" charset="0"/>
-                <a:cs typeface="Arial" panose="020B0604020202020204" pitchFamily="34" charset="0"/>
-              </a:rPr>
-              <a:t>endpoints</a:t>
+              <a:t>Selling partner API endpoints</a:t>
             </a:r>
             <a:endParaRPr lang="en-US" altLang="en-US" sz="1200" dirty="0">
               <a:latin typeface="Arial" panose="020B0604020202020204" pitchFamily="34" charset="0"/>
@@ -4149,7 +4143,7 @@
           <a:blip r:embed="rId12">
             <a:extLst>
               <a:ext uri="{96DAC541-7B7A-43D3-8B79-37D633B846F1}">
-                <asvg:svgBlip xmlns="" xmlns:asvg="http://schemas.microsoft.com/office/drawing/2016/SVG/main" r:embed="rId13"/>
+                <asvg:svgBlip xmlns:asvg="http://schemas.microsoft.com/office/drawing/2016/SVG/main" xmlns="" r:embed="rId13"/>
               </a:ext>
             </a:extLst>
           </a:blip>
@@ -4207,7 +4201,7 @@
           <a:blip r:embed="rId14">
             <a:extLst>
               <a:ext uri="{96DAC541-7B7A-43D3-8B79-37D633B846F1}">
-                <asvg:svgBlip xmlns="" xmlns:asvg="http://schemas.microsoft.com/office/drawing/2016/SVG/main" r:embed="rId22"/>
+                <asvg:svgBlip xmlns:asvg="http://schemas.microsoft.com/office/drawing/2016/SVG/main" xmlns="" r:embed="rId22"/>
               </a:ext>
             </a:extLst>
           </a:blip>
@@ -4216,7 +4210,7 @@
         </p:blipFill>
         <p:spPr bwMode="auto">
           <a:xfrm flipH="1">
-            <a:off x="1202405" y="2793365"/>
+            <a:off x="1202405" y="2767964"/>
             <a:ext cx="469900" cy="469900"/>
           </a:xfrm>
           <a:prstGeom prst="rect">
@@ -4263,7 +4257,7 @@
         </p:nvSpPr>
         <p:spPr bwMode="auto">
           <a:xfrm>
-            <a:off x="900780" y="3394854"/>
+            <a:off x="900780" y="3369453"/>
             <a:ext cx="1073150" cy="261610"/>
           </a:xfrm>
           <a:prstGeom prst="rect">
@@ -4428,7 +4422,7 @@
         </p:nvCxnSpPr>
         <p:spPr>
           <a:xfrm>
-            <a:off x="1672305" y="3028315"/>
+            <a:off x="1672305" y="3002914"/>
             <a:ext cx="1049338" cy="0"/>
           </a:xfrm>
           <a:prstGeom prst="straightConnector1">
@@ -4457,186 +4451,164 @@
           </a:fontRef>
         </p:style>
       </p:cxnSp>
-      <p:grpSp>
-        <p:nvGrpSpPr>
-          <p:cNvPr id="19" name="Group 25">
+      <p:sp>
+        <p:nvSpPr>
+          <p:cNvPr id="20" name="Freeform 19">
             <a:extLst>
               <a:ext uri="{FF2B5EF4-FFF2-40B4-BE49-F238E27FC236}">
-                <a16:creationId xmlns:a16="http://schemas.microsoft.com/office/drawing/2014/main" id="{E51E1B16-CFEE-C14B-A889-1F7444E7626E}"/>
+                <a16:creationId xmlns:a16="http://schemas.microsoft.com/office/drawing/2014/main" id="{5A63A47A-4922-D048-93AE-8AEE5D4BE271}"/>
               </a:ext>
             </a:extLst>
           </p:cNvPr>
-          <p:cNvGrpSpPr>
-            <a:grpSpLocks/>
-          </p:cNvGrpSpPr>
+          <p:cNvSpPr/>
           <p:nvPr/>
-        </p:nvGrpSpPr>
-        <p:grpSpPr bwMode="auto">
+        </p:nvSpPr>
+        <p:spPr bwMode="auto">
+          <a:xfrm rot="10800000">
+            <a:off x="4163624" y="2027287"/>
+            <a:ext cx="914400" cy="1936608"/>
+          </a:xfrm>
+          <a:custGeom>
+            <a:avLst/>
+            <a:gdLst>
+              <a:gd name="connsiteX0" fmla="*/ 0 w 622300"/>
+              <a:gd name="connsiteY0" fmla="*/ 0 h 1574800"/>
+              <a:gd name="connsiteX1" fmla="*/ 622300 w 622300"/>
+              <a:gd name="connsiteY1" fmla="*/ 0 h 1574800"/>
+              <a:gd name="connsiteX2" fmla="*/ 622300 w 622300"/>
+              <a:gd name="connsiteY2" fmla="*/ 1574800 h 1574800"/>
+              <a:gd name="connsiteX3" fmla="*/ 482600 w 622300"/>
+              <a:gd name="connsiteY3" fmla="*/ 1574800 h 1574800"/>
+              <a:gd name="connsiteX4" fmla="*/ 0 w 622300"/>
+              <a:gd name="connsiteY4" fmla="*/ 1574800 h 1574800"/>
+            </a:gdLst>
+            <a:ahLst/>
+            <a:cxnLst>
+              <a:cxn ang="0">
+                <a:pos x="connsiteX0" y="connsiteY0"/>
+              </a:cxn>
+              <a:cxn ang="0">
+                <a:pos x="connsiteX1" y="connsiteY1"/>
+              </a:cxn>
+              <a:cxn ang="0">
+                <a:pos x="connsiteX2" y="connsiteY2"/>
+              </a:cxn>
+              <a:cxn ang="0">
+                <a:pos x="connsiteX3" y="connsiteY3"/>
+              </a:cxn>
+              <a:cxn ang="0">
+                <a:pos x="connsiteX4" y="connsiteY4"/>
+              </a:cxn>
+            </a:cxnLst>
+            <a:rect l="l" t="t" r="r" b="b"/>
+            <a:pathLst>
+              <a:path w="622300" h="1574800">
+                <a:moveTo>
+                  <a:pt x="0" y="0"/>
+                </a:moveTo>
+                <a:lnTo>
+                  <a:pt x="622300" y="0"/>
+                </a:lnTo>
+                <a:lnTo>
+                  <a:pt x="622300" y="1574800"/>
+                </a:lnTo>
+                <a:lnTo>
+                  <a:pt x="482600" y="1574800"/>
+                </a:lnTo>
+                <a:lnTo>
+                  <a:pt x="0" y="1574800"/>
+                </a:lnTo>
+              </a:path>
+            </a:pathLst>
+          </a:custGeom>
+          <a:noFill/>
+          <a:ln w="12700">
+            <a:solidFill>
+              <a:schemeClr val="tx2"/>
+            </a:solidFill>
+            <a:headEnd type="arrow" w="med" len="sm"/>
+            <a:tailEnd type="arrow" w="med" len="sm"/>
+          </a:ln>
+        </p:spPr>
+        <p:style>
+          <a:lnRef idx="2">
+            <a:schemeClr val="accent1">
+              <a:shade val="50000"/>
+            </a:schemeClr>
+          </a:lnRef>
+          <a:fillRef idx="1">
+            <a:schemeClr val="accent1"/>
+          </a:fillRef>
+          <a:effectRef idx="0">
+            <a:schemeClr val="accent1"/>
+          </a:effectRef>
+          <a:fontRef idx="minor">
+            <a:schemeClr val="lt1"/>
+          </a:fontRef>
+        </p:style>
+        <p:txBody>
+          <a:bodyPr anchor="ctr"/>
+          <a:lstStyle/>
+          <a:p>
+            <a:pPr algn="ctr" eaLnBrk="1" fontAlgn="auto" hangingPunct="1">
+              <a:spcBef>
+                <a:spcPts val="0"/>
+              </a:spcBef>
+              <a:spcAft>
+                <a:spcPts val="0"/>
+              </a:spcAft>
+              <a:defRPr/>
+            </a:pPr>
+            <a:endParaRPr lang="en-US" dirty="0"/>
+          </a:p>
+        </p:txBody>
+      </p:sp>
+      <p:cxnSp>
+        <p:nvCxnSpPr>
+          <p:cNvPr id="21" name="Straight Arrow Connector 20">
+            <a:extLst>
+              <a:ext uri="{FF2B5EF4-FFF2-40B4-BE49-F238E27FC236}">
+                <a16:creationId xmlns:a16="http://schemas.microsoft.com/office/drawing/2014/main" id="{039E7995-43D5-3943-BB09-527E226ECF2B}"/>
+              </a:ext>
+            </a:extLst>
+          </p:cNvPr>
+          <p:cNvCxnSpPr>
+            <a:cxnSpLocks/>
+            <a:stCxn id="6" idx="3"/>
+          </p:cNvCxnSpPr>
+          <p:nvPr/>
+        </p:nvCxnSpPr>
+        <p:spPr bwMode="auto">
           <a:xfrm>
-            <a:off x="3483643" y="2027287"/>
-            <a:ext cx="1594381" cy="1936608"/>
-            <a:chOff x="2567514" y="1548217"/>
-            <a:chExt cx="1595317" cy="331243"/>
+            <a:off x="3483643" y="3002914"/>
+            <a:ext cx="679980" cy="0"/>
           </a:xfrm>
-        </p:grpSpPr>
-        <p:sp>
-          <p:nvSpPr>
-            <p:cNvPr id="20" name="Freeform 19">
-              <a:extLst>
-                <a:ext uri="{FF2B5EF4-FFF2-40B4-BE49-F238E27FC236}">
-                  <a16:creationId xmlns:a16="http://schemas.microsoft.com/office/drawing/2014/main" id="{5A63A47A-4922-D048-93AE-8AEE5D4BE271}"/>
-                </a:ext>
-              </a:extLst>
-            </p:cNvPr>
-            <p:cNvSpPr/>
-            <p:nvPr/>
-          </p:nvSpPr>
-          <p:spPr>
-            <a:xfrm rot="10800000">
-              <a:off x="3247894" y="1548217"/>
-              <a:ext cx="914937" cy="331243"/>
-            </a:xfrm>
-            <a:custGeom>
-              <a:avLst/>
-              <a:gdLst>
-                <a:gd name="connsiteX0" fmla="*/ 0 w 622300"/>
-                <a:gd name="connsiteY0" fmla="*/ 0 h 1574800"/>
-                <a:gd name="connsiteX1" fmla="*/ 622300 w 622300"/>
-                <a:gd name="connsiteY1" fmla="*/ 0 h 1574800"/>
-                <a:gd name="connsiteX2" fmla="*/ 622300 w 622300"/>
-                <a:gd name="connsiteY2" fmla="*/ 1574800 h 1574800"/>
-                <a:gd name="connsiteX3" fmla="*/ 482600 w 622300"/>
-                <a:gd name="connsiteY3" fmla="*/ 1574800 h 1574800"/>
-                <a:gd name="connsiteX4" fmla="*/ 0 w 622300"/>
-                <a:gd name="connsiteY4" fmla="*/ 1574800 h 1574800"/>
-              </a:gdLst>
-              <a:ahLst/>
-              <a:cxnLst>
-                <a:cxn ang="0">
-                  <a:pos x="connsiteX0" y="connsiteY0"/>
-                </a:cxn>
-                <a:cxn ang="0">
-                  <a:pos x="connsiteX1" y="connsiteY1"/>
-                </a:cxn>
-                <a:cxn ang="0">
-                  <a:pos x="connsiteX2" y="connsiteY2"/>
-                </a:cxn>
-                <a:cxn ang="0">
-                  <a:pos x="connsiteX3" y="connsiteY3"/>
-                </a:cxn>
-                <a:cxn ang="0">
-                  <a:pos x="connsiteX4" y="connsiteY4"/>
-                </a:cxn>
-              </a:cxnLst>
-              <a:rect l="l" t="t" r="r" b="b"/>
-              <a:pathLst>
-                <a:path w="622300" h="1574800">
-                  <a:moveTo>
-                    <a:pt x="0" y="0"/>
-                  </a:moveTo>
-                  <a:lnTo>
-                    <a:pt x="622300" y="0"/>
-                  </a:lnTo>
-                  <a:lnTo>
-                    <a:pt x="622300" y="1574800"/>
-                  </a:lnTo>
-                  <a:lnTo>
-                    <a:pt x="482600" y="1574800"/>
-                  </a:lnTo>
-                  <a:lnTo>
-                    <a:pt x="0" y="1574800"/>
-                  </a:lnTo>
-                </a:path>
-              </a:pathLst>
-            </a:custGeom>
-            <a:noFill/>
-            <a:ln w="12700">
-              <a:solidFill>
-                <a:schemeClr val="tx2"/>
-              </a:solidFill>
-              <a:headEnd type="arrow" w="med" len="sm"/>
-              <a:tailEnd type="arrow" w="med" len="sm"/>
-            </a:ln>
-          </p:spPr>
-          <p:style>
-            <a:lnRef idx="2">
-              <a:schemeClr val="accent1">
-                <a:shade val="50000"/>
-              </a:schemeClr>
-            </a:lnRef>
-            <a:fillRef idx="1">
-              <a:schemeClr val="accent1"/>
-            </a:fillRef>
-            <a:effectRef idx="0">
-              <a:schemeClr val="accent1"/>
-            </a:effectRef>
-            <a:fontRef idx="minor">
-              <a:schemeClr val="lt1"/>
-            </a:fontRef>
-          </p:style>
-          <p:txBody>
-            <a:bodyPr anchor="ctr"/>
-            <a:lstStyle/>
-            <a:p>
-              <a:pPr algn="ctr" eaLnBrk="1" fontAlgn="auto" hangingPunct="1">
-                <a:spcBef>
-                  <a:spcPts val="0"/>
-                </a:spcBef>
-                <a:spcAft>
-                  <a:spcPts val="0"/>
-                </a:spcAft>
-                <a:defRPr/>
-              </a:pPr>
-              <a:endParaRPr lang="en-US" dirty="0"/>
-            </a:p>
-          </p:txBody>
-        </p:sp>
-        <p:cxnSp>
-          <p:nvCxnSpPr>
-            <p:cNvPr id="21" name="Straight Arrow Connector 20">
-              <a:extLst>
-                <a:ext uri="{FF2B5EF4-FFF2-40B4-BE49-F238E27FC236}">
-                  <a16:creationId xmlns:a16="http://schemas.microsoft.com/office/drawing/2014/main" id="{039E7995-43D5-3943-BB09-527E226ECF2B}"/>
-                </a:ext>
-              </a:extLst>
-            </p:cNvPr>
-            <p:cNvCxnSpPr>
-              <a:cxnSpLocks/>
-            </p:cNvCxnSpPr>
-            <p:nvPr/>
-          </p:nvCxnSpPr>
-          <p:spPr>
-            <a:xfrm>
-              <a:off x="2567514" y="1711337"/>
-              <a:ext cx="680380" cy="0"/>
-            </a:xfrm>
-            <a:prstGeom prst="straightConnector1">
-              <a:avLst/>
-            </a:prstGeom>
-            <a:ln w="12700">
-              <a:solidFill>
-                <a:srgbClr val="545B64"/>
-              </a:solidFill>
-              <a:headEnd type="none" w="med" len="sm"/>
-              <a:tailEnd type="none" w="med" len="sm"/>
-            </a:ln>
-          </p:spPr>
-          <p:style>
-            <a:lnRef idx="1">
-              <a:schemeClr val="accent1"/>
-            </a:lnRef>
-            <a:fillRef idx="0">
-              <a:schemeClr val="accent1"/>
-            </a:fillRef>
-            <a:effectRef idx="0">
-              <a:schemeClr val="accent1"/>
-            </a:effectRef>
-            <a:fontRef idx="minor">
-              <a:schemeClr val="tx1"/>
-            </a:fontRef>
-          </p:style>
-        </p:cxnSp>
-      </p:grpSp>
+          <a:prstGeom prst="straightConnector1">
+            <a:avLst/>
+          </a:prstGeom>
+          <a:ln w="12700">
+            <a:solidFill>
+              <a:srgbClr val="545B64"/>
+            </a:solidFill>
+            <a:headEnd type="none" w="med" len="sm"/>
+            <a:tailEnd type="none" w="med" len="sm"/>
+          </a:ln>
+        </p:spPr>
+        <p:style>
+          <a:lnRef idx="1">
+            <a:schemeClr val="accent1"/>
+          </a:lnRef>
+          <a:fillRef idx="0">
+            <a:schemeClr val="accent1"/>
+          </a:fillRef>
+          <a:effectRef idx="0">
+            <a:schemeClr val="accent1"/>
+          </a:effectRef>
+          <a:fontRef idx="minor">
+            <a:schemeClr val="tx1"/>
+          </a:fontRef>
+        </p:style>
+      </p:cxnSp>
       <p:cxnSp>
         <p:nvCxnSpPr>
           <p:cNvPr id="24" name="Straight Arrow Connector 23">
@@ -4655,8 +4627,8 @@
         </p:nvCxnSpPr>
         <p:spPr>
           <a:xfrm>
-            <a:off x="5861053" y="2027287"/>
-            <a:ext cx="873777" cy="0"/>
+            <a:off x="5861053" y="2020937"/>
+            <a:ext cx="873777" cy="6350"/>
           </a:xfrm>
           <a:prstGeom prst="straightConnector1">
             <a:avLst/>
@@ -4702,8 +4674,8 @@
         </p:nvCxnSpPr>
         <p:spPr>
           <a:xfrm>
-            <a:off x="5861053" y="3963895"/>
-            <a:ext cx="2352665" cy="0"/>
+            <a:off x="5861053" y="3957545"/>
+            <a:ext cx="2352665" cy="6350"/>
           </a:xfrm>
           <a:prstGeom prst="straightConnector1">
             <a:avLst/>
@@ -4735,6 +4707,2478 @@
     <p:extLst>
       <p:ext uri="{BB962C8B-B14F-4D97-AF65-F5344CB8AC3E}">
         <p14:creationId xmlns:p14="http://schemas.microsoft.com/office/powerpoint/2010/main" val="3993117076"/>
+      </p:ext>
+    </p:extLst>
+  </p:cSld>
+  <p:clrMapOvr>
+    <a:masterClrMapping/>
+  </p:clrMapOvr>
+</p:sld>
+</file>
+
+<file path=ppt/slides/slide2.xml><?xml version="1.0" encoding="utf-8"?>
+<p:sld xmlns:a="http://schemas.openxmlformats.org/drawingml/2006/main" xmlns:r="http://schemas.openxmlformats.org/officeDocument/2006/relationships" xmlns:p="http://schemas.openxmlformats.org/presentationml/2006/main">
+  <p:cSld>
+    <p:spTree>
+      <p:nvGrpSpPr>
+        <p:cNvPr id="1" name=""/>
+        <p:cNvGrpSpPr/>
+        <p:nvPr/>
+      </p:nvGrpSpPr>
+      <p:grpSpPr>
+        <a:xfrm>
+          <a:off x="0" y="0"/>
+          <a:ext cx="0" cy="0"/>
+          <a:chOff x="0" y="0"/>
+          <a:chExt cx="0" cy="0"/>
+        </a:xfrm>
+      </p:grpSpPr>
+      <p:sp>
+        <p:nvSpPr>
+          <p:cNvPr id="4" name="Rectangle 3">
+            <a:extLst>
+              <a:ext uri="{FF2B5EF4-FFF2-40B4-BE49-F238E27FC236}">
+                <a16:creationId xmlns:a16="http://schemas.microsoft.com/office/drawing/2014/main" id="{E3C373A7-C79E-F040-A456-79E6A4AF1C21}"/>
+              </a:ext>
+            </a:extLst>
+          </p:cNvPr>
+          <p:cNvSpPr/>
+          <p:nvPr/>
+        </p:nvSpPr>
+        <p:spPr>
+          <a:xfrm>
+            <a:off x="2183598" y="1126066"/>
+            <a:ext cx="4259536" cy="3826933"/>
+          </a:xfrm>
+          <a:prstGeom prst="rect">
+            <a:avLst/>
+          </a:prstGeom>
+          <a:noFill/>
+          <a:ln w="12700">
+            <a:solidFill>
+              <a:schemeClr val="tx1"/>
+            </a:solidFill>
+          </a:ln>
+        </p:spPr>
+        <p:style>
+          <a:lnRef idx="2">
+            <a:schemeClr val="accent1">
+              <a:shade val="50000"/>
+            </a:schemeClr>
+          </a:lnRef>
+          <a:fillRef idx="1">
+            <a:schemeClr val="accent1"/>
+          </a:fillRef>
+          <a:effectRef idx="0">
+            <a:schemeClr val="accent1"/>
+          </a:effectRef>
+          <a:fontRef idx="minor">
+            <a:schemeClr val="lt1"/>
+          </a:fontRef>
+        </p:style>
+        <p:txBody>
+          <a:bodyPr lIns="502920" tIns="91440"/>
+          <a:lstStyle/>
+          <a:p>
+            <a:pPr eaLnBrk="1" fontAlgn="auto" hangingPunct="1">
+              <a:spcBef>
+                <a:spcPts val="0"/>
+              </a:spcBef>
+              <a:spcAft>
+                <a:spcPts val="0"/>
+              </a:spcAft>
+              <a:defRPr/>
+            </a:pPr>
+            <a:r>
+              <a:rPr lang="en-US" sz="1200" dirty="0">
+                <a:solidFill>
+                  <a:sysClr val="windowText" lastClr="000000"/>
+                </a:solidFill>
+                <a:latin typeface="Arial" panose="020B0604020202020204" pitchFamily="34" charset="0"/>
+                <a:cs typeface="Arial" panose="020B0604020202020204" pitchFamily="34" charset="0"/>
+              </a:rPr>
+              <a:t>AWS Cloud</a:t>
+            </a:r>
+          </a:p>
+        </p:txBody>
+      </p:sp>
+      <p:pic>
+        <p:nvPicPr>
+          <p:cNvPr id="5" name="Graphic 33">
+            <a:extLst>
+              <a:ext uri="{FF2B5EF4-FFF2-40B4-BE49-F238E27FC236}">
+                <a16:creationId xmlns:a16="http://schemas.microsoft.com/office/drawing/2014/main" id="{698D4BC3-E737-F248-BFA7-23A251040C64}"/>
+              </a:ext>
+            </a:extLst>
+          </p:cNvPr>
+          <p:cNvPicPr>
+            <a:picLocks noChangeAspect="1"/>
+          </p:cNvPicPr>
+          <p:nvPr/>
+        </p:nvPicPr>
+        <p:blipFill>
+          <a:blip r:embed="rId2">
+            <a:extLst>
+              <a:ext uri="{96DAC541-7B7A-43D3-8B79-37D633B846F1}">
+                <asvg:svgBlip xmlns:asvg="http://schemas.microsoft.com/office/drawing/2016/SVG/main" xmlns="" r:embed="rId7"/>
+              </a:ext>
+            </a:extLst>
+          </a:blip>
+          <a:srcRect/>
+          <a:stretch/>
+        </p:blipFill>
+        <p:spPr>
+          <a:xfrm>
+            <a:off x="2183598" y="1126066"/>
+            <a:ext cx="381000" cy="381000"/>
+          </a:xfrm>
+          <a:prstGeom prst="rect">
+            <a:avLst/>
+          </a:prstGeom>
+        </p:spPr>
+      </p:pic>
+      <p:pic>
+        <p:nvPicPr>
+          <p:cNvPr id="6" name="Graphic 21">
+            <a:extLst>
+              <a:ext uri="{FF2B5EF4-FFF2-40B4-BE49-F238E27FC236}">
+                <a16:creationId xmlns:a16="http://schemas.microsoft.com/office/drawing/2014/main" id="{B45903B4-7E49-3249-ACFD-E2CF246CA35A}"/>
+              </a:ext>
+            </a:extLst>
+          </p:cNvPr>
+          <p:cNvPicPr>
+            <a:picLocks noChangeAspect="1" noChangeArrowheads="1"/>
+          </p:cNvPicPr>
+          <p:nvPr/>
+        </p:nvPicPr>
+        <p:blipFill>
+          <a:blip r:embed="rId8" cstate="print">
+            <a:extLst>
+              <a:ext uri="{28A0092B-C50C-407E-A947-70E740481C1C}">
+                <a14:useLocalDpi xmlns:a14="http://schemas.microsoft.com/office/drawing/2010/main" val="0"/>
+              </a:ext>
+            </a:extLst>
+          </a:blip>
+          <a:srcRect/>
+          <a:stretch>
+            <a:fillRect/>
+          </a:stretch>
+        </p:blipFill>
+        <p:spPr bwMode="auto">
+          <a:xfrm>
+            <a:off x="2721643" y="2621914"/>
+            <a:ext cx="762000" cy="762000"/>
+          </a:xfrm>
+          <a:prstGeom prst="rect">
+            <a:avLst/>
+          </a:prstGeom>
+          <a:noFill/>
+          <a:ln>
+            <a:noFill/>
+          </a:ln>
+          <a:extLst>
+            <a:ext uri="{909E8E84-426E-40DD-AFC4-6F175D3DCCD1}">
+              <a14:hiddenFill xmlns:a14="http://schemas.microsoft.com/office/drawing/2010/main">
+                <a:solidFill>
+                  <a:srgbClr val="FFFFFF"/>
+                </a:solidFill>
+              </a14:hiddenFill>
+            </a:ext>
+            <a:ext uri="{91240B29-F687-4F45-9708-019B960494DF}">
+              <a14:hiddenLine xmlns:a14="http://schemas.microsoft.com/office/drawing/2010/main" w="9525">
+                <a:solidFill>
+                  <a:srgbClr val="000000"/>
+                </a:solidFill>
+                <a:miter lim="800000"/>
+                <a:headEnd/>
+                <a:tailEnd/>
+              </a14:hiddenLine>
+            </a:ext>
+          </a:extLst>
+        </p:spPr>
+      </p:pic>
+      <p:sp>
+        <p:nvSpPr>
+          <p:cNvPr id="7" name="TextBox 12">
+            <a:extLst>
+              <a:ext uri="{FF2B5EF4-FFF2-40B4-BE49-F238E27FC236}">
+                <a16:creationId xmlns:a16="http://schemas.microsoft.com/office/drawing/2014/main" id="{471A2A30-254D-C545-BF6F-F947BDB89684}"/>
+              </a:ext>
+            </a:extLst>
+          </p:cNvPr>
+          <p:cNvSpPr txBox="1">
+            <a:spLocks noChangeArrowheads="1"/>
+          </p:cNvSpPr>
+          <p:nvPr/>
+        </p:nvSpPr>
+        <p:spPr bwMode="auto">
+          <a:xfrm>
+            <a:off x="1973931" y="3383914"/>
+            <a:ext cx="2279650" cy="276999"/>
+          </a:xfrm>
+          <a:prstGeom prst="rect">
+            <a:avLst/>
+          </a:prstGeom>
+          <a:noFill/>
+          <a:ln>
+            <a:noFill/>
+          </a:ln>
+          <a:extLst>
+            <a:ext uri="{909E8E84-426E-40DD-AFC4-6F175D3DCCD1}">
+              <a14:hiddenFill xmlns:a14="http://schemas.microsoft.com/office/drawing/2010/main">
+                <a:solidFill>
+                  <a:srgbClr val="FFFFFF"/>
+                </a:solidFill>
+              </a14:hiddenFill>
+            </a:ext>
+            <a:ext uri="{91240B29-F687-4F45-9708-019B960494DF}">
+              <a14:hiddenLine xmlns:a14="http://schemas.microsoft.com/office/drawing/2010/main" w="9525">
+                <a:solidFill>
+                  <a:srgbClr val="000000"/>
+                </a:solidFill>
+                <a:miter lim="800000"/>
+                <a:headEnd/>
+                <a:tailEnd/>
+              </a14:hiddenLine>
+            </a:ext>
+          </a:extLst>
+        </p:spPr>
+        <p:txBody>
+          <a:bodyPr>
+            <a:spAutoFit/>
+          </a:bodyPr>
+          <a:lstStyle>
+            <a:lvl1pPr>
+              <a:defRPr>
+                <a:solidFill>
+                  <a:schemeClr val="tx1"/>
+                </a:solidFill>
+                <a:latin typeface="Calibri" panose="020F0502020204030204" pitchFamily="34" charset="0"/>
+              </a:defRPr>
+            </a:lvl1pPr>
+            <a:lvl2pPr marL="742950" indent="-285750">
+              <a:defRPr>
+                <a:solidFill>
+                  <a:schemeClr val="tx1"/>
+                </a:solidFill>
+                <a:latin typeface="Calibri" panose="020F0502020204030204" pitchFamily="34" charset="0"/>
+              </a:defRPr>
+            </a:lvl2pPr>
+            <a:lvl3pPr marL="1143000" indent="-228600">
+              <a:defRPr>
+                <a:solidFill>
+                  <a:schemeClr val="tx1"/>
+                </a:solidFill>
+                <a:latin typeface="Calibri" panose="020F0502020204030204" pitchFamily="34" charset="0"/>
+              </a:defRPr>
+            </a:lvl3pPr>
+            <a:lvl4pPr marL="1600200" indent="-228600">
+              <a:defRPr>
+                <a:solidFill>
+                  <a:schemeClr val="tx1"/>
+                </a:solidFill>
+                <a:latin typeface="Calibri" panose="020F0502020204030204" pitchFamily="34" charset="0"/>
+              </a:defRPr>
+            </a:lvl4pPr>
+            <a:lvl5pPr marL="2057400" indent="-228600">
+              <a:defRPr>
+                <a:solidFill>
+                  <a:schemeClr val="tx1"/>
+                </a:solidFill>
+                <a:latin typeface="Calibri" panose="020F0502020204030204" pitchFamily="34" charset="0"/>
+              </a:defRPr>
+            </a:lvl5pPr>
+            <a:lvl6pPr marL="2514600" indent="-228600" eaLnBrk="0" fontAlgn="base" hangingPunct="0">
+              <a:spcBef>
+                <a:spcPct val="0"/>
+              </a:spcBef>
+              <a:spcAft>
+                <a:spcPct val="0"/>
+              </a:spcAft>
+              <a:defRPr>
+                <a:solidFill>
+                  <a:schemeClr val="tx1"/>
+                </a:solidFill>
+                <a:latin typeface="Calibri" panose="020F0502020204030204" pitchFamily="34" charset="0"/>
+              </a:defRPr>
+            </a:lvl6pPr>
+            <a:lvl7pPr marL="2971800" indent="-228600" eaLnBrk="0" fontAlgn="base" hangingPunct="0">
+              <a:spcBef>
+                <a:spcPct val="0"/>
+              </a:spcBef>
+              <a:spcAft>
+                <a:spcPct val="0"/>
+              </a:spcAft>
+              <a:defRPr>
+                <a:solidFill>
+                  <a:schemeClr val="tx1"/>
+                </a:solidFill>
+                <a:latin typeface="Calibri" panose="020F0502020204030204" pitchFamily="34" charset="0"/>
+              </a:defRPr>
+            </a:lvl7pPr>
+            <a:lvl8pPr marL="3429000" indent="-228600" eaLnBrk="0" fontAlgn="base" hangingPunct="0">
+              <a:spcBef>
+                <a:spcPct val="0"/>
+              </a:spcBef>
+              <a:spcAft>
+                <a:spcPct val="0"/>
+              </a:spcAft>
+              <a:defRPr>
+                <a:solidFill>
+                  <a:schemeClr val="tx1"/>
+                </a:solidFill>
+                <a:latin typeface="Calibri" panose="020F0502020204030204" pitchFamily="34" charset="0"/>
+              </a:defRPr>
+            </a:lvl8pPr>
+            <a:lvl9pPr marL="3886200" indent="-228600" eaLnBrk="0" fontAlgn="base" hangingPunct="0">
+              <a:spcBef>
+                <a:spcPct val="0"/>
+              </a:spcBef>
+              <a:spcAft>
+                <a:spcPct val="0"/>
+              </a:spcAft>
+              <a:defRPr>
+                <a:solidFill>
+                  <a:schemeClr val="tx1"/>
+                </a:solidFill>
+                <a:latin typeface="Calibri" panose="020F0502020204030204" pitchFamily="34" charset="0"/>
+              </a:defRPr>
+            </a:lvl9pPr>
+          </a:lstStyle>
+          <a:p>
+            <a:pPr algn="ctr" eaLnBrk="1" hangingPunct="1"/>
+            <a:r>
+              <a:rPr lang="en-US" altLang="en-US" sz="1200" dirty="0">
+                <a:latin typeface="Arial" panose="020B0604020202020204" pitchFamily="34" charset="0"/>
+                <a:ea typeface="Amazon Ember" panose="020B0603020204020204" pitchFamily="34" charset="0"/>
+                <a:cs typeface="Arial" panose="020B0604020202020204" pitchFamily="34" charset="0"/>
+              </a:rPr>
+              <a:t>AWS CloudFormation</a:t>
+            </a:r>
+          </a:p>
+        </p:txBody>
+      </p:sp>
+      <p:sp>
+        <p:nvSpPr>
+          <p:cNvPr id="10" name="TextBox 29">
+            <a:extLst>
+              <a:ext uri="{FF2B5EF4-FFF2-40B4-BE49-F238E27FC236}">
+                <a16:creationId xmlns:a16="http://schemas.microsoft.com/office/drawing/2014/main" id="{A72793CC-CF40-214B-819B-BDB0EF3CE88C}"/>
+              </a:ext>
+            </a:extLst>
+          </p:cNvPr>
+          <p:cNvSpPr txBox="1">
+            <a:spLocks noChangeArrowheads="1"/>
+          </p:cNvSpPr>
+          <p:nvPr/>
+        </p:nvSpPr>
+        <p:spPr bwMode="auto">
+          <a:xfrm>
+            <a:off x="4637091" y="2138210"/>
+            <a:ext cx="1685925" cy="276999"/>
+          </a:xfrm>
+          <a:prstGeom prst="rect">
+            <a:avLst/>
+          </a:prstGeom>
+          <a:noFill/>
+          <a:ln>
+            <a:noFill/>
+          </a:ln>
+          <a:extLst>
+            <a:ext uri="{909E8E84-426E-40DD-AFC4-6F175D3DCCD1}">
+              <a14:hiddenFill xmlns:a14="http://schemas.microsoft.com/office/drawing/2010/main">
+                <a:solidFill>
+                  <a:srgbClr val="FFFFFF"/>
+                </a:solidFill>
+              </a14:hiddenFill>
+            </a:ext>
+            <a:ext uri="{91240B29-F687-4F45-9708-019B960494DF}">
+              <a14:hiddenLine xmlns:a14="http://schemas.microsoft.com/office/drawing/2010/main" w="9525">
+                <a:solidFill>
+                  <a:srgbClr val="000000"/>
+                </a:solidFill>
+                <a:miter lim="800000"/>
+                <a:headEnd/>
+                <a:tailEnd/>
+              </a14:hiddenLine>
+            </a:ext>
+          </a:extLst>
+        </p:spPr>
+        <p:txBody>
+          <a:bodyPr>
+            <a:spAutoFit/>
+          </a:bodyPr>
+          <a:lstStyle>
+            <a:lvl1pPr>
+              <a:defRPr>
+                <a:solidFill>
+                  <a:schemeClr val="tx1"/>
+                </a:solidFill>
+                <a:latin typeface="Calibri" panose="020F0502020204030204" pitchFamily="34" charset="0"/>
+              </a:defRPr>
+            </a:lvl1pPr>
+            <a:lvl2pPr marL="742950" indent="-285750">
+              <a:defRPr>
+                <a:solidFill>
+                  <a:schemeClr val="tx1"/>
+                </a:solidFill>
+                <a:latin typeface="Calibri" panose="020F0502020204030204" pitchFamily="34" charset="0"/>
+              </a:defRPr>
+            </a:lvl2pPr>
+            <a:lvl3pPr marL="1143000" indent="-228600">
+              <a:defRPr>
+                <a:solidFill>
+                  <a:schemeClr val="tx1"/>
+                </a:solidFill>
+                <a:latin typeface="Calibri" panose="020F0502020204030204" pitchFamily="34" charset="0"/>
+              </a:defRPr>
+            </a:lvl3pPr>
+            <a:lvl4pPr marL="1600200" indent="-228600">
+              <a:defRPr>
+                <a:solidFill>
+                  <a:schemeClr val="tx1"/>
+                </a:solidFill>
+                <a:latin typeface="Calibri" panose="020F0502020204030204" pitchFamily="34" charset="0"/>
+              </a:defRPr>
+            </a:lvl4pPr>
+            <a:lvl5pPr marL="2057400" indent="-228600">
+              <a:defRPr>
+                <a:solidFill>
+                  <a:schemeClr val="tx1"/>
+                </a:solidFill>
+                <a:latin typeface="Calibri" panose="020F0502020204030204" pitchFamily="34" charset="0"/>
+              </a:defRPr>
+            </a:lvl5pPr>
+            <a:lvl6pPr marL="2514600" indent="-228600" eaLnBrk="0" fontAlgn="base" hangingPunct="0">
+              <a:spcBef>
+                <a:spcPct val="0"/>
+              </a:spcBef>
+              <a:spcAft>
+                <a:spcPct val="0"/>
+              </a:spcAft>
+              <a:defRPr>
+                <a:solidFill>
+                  <a:schemeClr val="tx1"/>
+                </a:solidFill>
+                <a:latin typeface="Calibri" panose="020F0502020204030204" pitchFamily="34" charset="0"/>
+              </a:defRPr>
+            </a:lvl6pPr>
+            <a:lvl7pPr marL="2971800" indent="-228600" eaLnBrk="0" fontAlgn="base" hangingPunct="0">
+              <a:spcBef>
+                <a:spcPct val="0"/>
+              </a:spcBef>
+              <a:spcAft>
+                <a:spcPct val="0"/>
+              </a:spcAft>
+              <a:defRPr>
+                <a:solidFill>
+                  <a:schemeClr val="tx1"/>
+                </a:solidFill>
+                <a:latin typeface="Calibri" panose="020F0502020204030204" pitchFamily="34" charset="0"/>
+              </a:defRPr>
+            </a:lvl7pPr>
+            <a:lvl8pPr marL="3429000" indent="-228600" eaLnBrk="0" fontAlgn="base" hangingPunct="0">
+              <a:spcBef>
+                <a:spcPct val="0"/>
+              </a:spcBef>
+              <a:spcAft>
+                <a:spcPct val="0"/>
+              </a:spcAft>
+              <a:defRPr>
+                <a:solidFill>
+                  <a:schemeClr val="tx1"/>
+                </a:solidFill>
+                <a:latin typeface="Calibri" panose="020F0502020204030204" pitchFamily="34" charset="0"/>
+              </a:defRPr>
+            </a:lvl8pPr>
+            <a:lvl9pPr marL="3886200" indent="-228600" eaLnBrk="0" fontAlgn="base" hangingPunct="0">
+              <a:spcBef>
+                <a:spcPct val="0"/>
+              </a:spcBef>
+              <a:spcAft>
+                <a:spcPct val="0"/>
+              </a:spcAft>
+              <a:defRPr>
+                <a:solidFill>
+                  <a:schemeClr val="tx1"/>
+                </a:solidFill>
+                <a:latin typeface="Calibri" panose="020F0502020204030204" pitchFamily="34" charset="0"/>
+              </a:defRPr>
+            </a:lvl9pPr>
+          </a:lstStyle>
+          <a:p>
+            <a:pPr algn="ctr" eaLnBrk="1" hangingPunct="1"/>
+            <a:r>
+              <a:rPr lang="en-US" altLang="en-US" sz="1200" dirty="0">
+                <a:latin typeface="Arial" panose="020B0604020202020204" pitchFamily="34" charset="0"/>
+                <a:ea typeface="Amazon Ember" panose="020B0603020204020204" pitchFamily="34" charset="0"/>
+                <a:cs typeface="Arial" panose="020B0604020202020204" pitchFamily="34" charset="0"/>
+              </a:rPr>
+              <a:t>Role</a:t>
+            </a:r>
+          </a:p>
+        </p:txBody>
+      </p:sp>
+      <p:pic>
+        <p:nvPicPr>
+          <p:cNvPr id="11" name="Graphic 49">
+            <a:extLst>
+              <a:ext uri="{FF2B5EF4-FFF2-40B4-BE49-F238E27FC236}">
+                <a16:creationId xmlns:a16="http://schemas.microsoft.com/office/drawing/2014/main" id="{5A8C48C1-32E1-C747-BB4B-5E3B849CF7A7}"/>
+              </a:ext>
+            </a:extLst>
+          </p:cNvPr>
+          <p:cNvPicPr>
+            <a:picLocks noChangeAspect="1" noChangeArrowheads="1"/>
+          </p:cNvPicPr>
+          <p:nvPr/>
+        </p:nvPicPr>
+        <p:blipFill>
+          <a:blip r:embed="rId9" cstate="print">
+            <a:extLst>
+              <a:ext uri="{28A0092B-C50C-407E-A947-70E740481C1C}">
+                <a14:useLocalDpi xmlns:a14="http://schemas.microsoft.com/office/drawing/2010/main" val="0"/>
+              </a:ext>
+            </a:extLst>
+          </a:blip>
+          <a:srcRect/>
+          <a:stretch>
+            <a:fillRect/>
+          </a:stretch>
+        </p:blipFill>
+        <p:spPr bwMode="auto">
+          <a:xfrm>
+            <a:off x="5251453" y="1790220"/>
+            <a:ext cx="457200" cy="457200"/>
+          </a:xfrm>
+          <a:prstGeom prst="rect">
+            <a:avLst/>
+          </a:prstGeom>
+          <a:noFill/>
+          <a:ln>
+            <a:noFill/>
+          </a:ln>
+          <a:extLst>
+            <a:ext uri="{909E8E84-426E-40DD-AFC4-6F175D3DCCD1}">
+              <a14:hiddenFill xmlns:a14="http://schemas.microsoft.com/office/drawing/2010/main">
+                <a:solidFill>
+                  <a:srgbClr val="FFFFFF"/>
+                </a:solidFill>
+              </a14:hiddenFill>
+            </a:ext>
+            <a:ext uri="{91240B29-F687-4F45-9708-019B960494DF}">
+              <a14:hiddenLine xmlns:a14="http://schemas.microsoft.com/office/drawing/2010/main" w="9525">
+                <a:solidFill>
+                  <a:srgbClr val="000000"/>
+                </a:solidFill>
+                <a:miter lim="800000"/>
+                <a:headEnd/>
+                <a:tailEnd/>
+              </a14:hiddenLine>
+            </a:ext>
+          </a:extLst>
+        </p:spPr>
+      </p:pic>
+      <p:pic>
+        <p:nvPicPr>
+          <p:cNvPr id="12" name="Graphic 10">
+            <a:extLst>
+              <a:ext uri="{FF2B5EF4-FFF2-40B4-BE49-F238E27FC236}">
+                <a16:creationId xmlns:a16="http://schemas.microsoft.com/office/drawing/2014/main" id="{7249C1EC-5A69-3C4D-9DDF-0DB93BB70BC6}"/>
+              </a:ext>
+            </a:extLst>
+          </p:cNvPr>
+          <p:cNvPicPr>
+            <a:picLocks noChangeAspect="1" noChangeArrowheads="1"/>
+          </p:cNvPicPr>
+          <p:nvPr/>
+        </p:nvPicPr>
+        <p:blipFill>
+          <a:blip r:embed="rId10" cstate="print">
+            <a:extLst>
+              <a:ext uri="{28A0092B-C50C-407E-A947-70E740481C1C}">
+                <a14:useLocalDpi xmlns:a14="http://schemas.microsoft.com/office/drawing/2010/main" val="0"/>
+              </a:ext>
+            </a:extLst>
+          </a:blip>
+          <a:srcRect/>
+          <a:stretch>
+            <a:fillRect/>
+          </a:stretch>
+        </p:blipFill>
+        <p:spPr bwMode="auto">
+          <a:xfrm>
+            <a:off x="5099053" y="3576545"/>
+            <a:ext cx="762000" cy="762000"/>
+          </a:xfrm>
+          <a:prstGeom prst="rect">
+            <a:avLst/>
+          </a:prstGeom>
+          <a:noFill/>
+          <a:ln>
+            <a:noFill/>
+          </a:ln>
+          <a:extLst>
+            <a:ext uri="{909E8E84-426E-40DD-AFC4-6F175D3DCCD1}">
+              <a14:hiddenFill xmlns:a14="http://schemas.microsoft.com/office/drawing/2010/main">
+                <a:solidFill>
+                  <a:srgbClr val="FFFFFF"/>
+                </a:solidFill>
+              </a14:hiddenFill>
+            </a:ext>
+            <a:ext uri="{91240B29-F687-4F45-9708-019B960494DF}">
+              <a14:hiddenLine xmlns:a14="http://schemas.microsoft.com/office/drawing/2010/main" w="9525">
+                <a:solidFill>
+                  <a:srgbClr val="000000"/>
+                </a:solidFill>
+                <a:miter lim="800000"/>
+                <a:headEnd/>
+                <a:tailEnd/>
+              </a14:hiddenLine>
+            </a:ext>
+          </a:extLst>
+        </p:spPr>
+      </p:pic>
+      <p:sp>
+        <p:nvSpPr>
+          <p:cNvPr id="13" name="TextBox 20">
+            <a:extLst>
+              <a:ext uri="{FF2B5EF4-FFF2-40B4-BE49-F238E27FC236}">
+                <a16:creationId xmlns:a16="http://schemas.microsoft.com/office/drawing/2014/main" id="{E5D4A7D0-5E44-1943-968A-C198F40D0E71}"/>
+              </a:ext>
+            </a:extLst>
+          </p:cNvPr>
+          <p:cNvSpPr txBox="1">
+            <a:spLocks noChangeArrowheads="1"/>
+          </p:cNvSpPr>
+          <p:nvPr/>
+        </p:nvSpPr>
+        <p:spPr bwMode="auto">
+          <a:xfrm>
+            <a:off x="4333878" y="4344101"/>
+            <a:ext cx="2292350" cy="276999"/>
+          </a:xfrm>
+          <a:prstGeom prst="rect">
+            <a:avLst/>
+          </a:prstGeom>
+          <a:noFill/>
+          <a:ln>
+            <a:noFill/>
+          </a:ln>
+          <a:extLst>
+            <a:ext uri="{909E8E84-426E-40DD-AFC4-6F175D3DCCD1}">
+              <a14:hiddenFill xmlns:a14="http://schemas.microsoft.com/office/drawing/2010/main">
+                <a:solidFill>
+                  <a:srgbClr val="FFFFFF"/>
+                </a:solidFill>
+              </a14:hiddenFill>
+            </a:ext>
+            <a:ext uri="{91240B29-F687-4F45-9708-019B960494DF}">
+              <a14:hiddenLine xmlns:a14="http://schemas.microsoft.com/office/drawing/2010/main" w="9525">
+                <a:solidFill>
+                  <a:srgbClr val="000000"/>
+                </a:solidFill>
+                <a:miter lim="800000"/>
+                <a:headEnd/>
+                <a:tailEnd/>
+              </a14:hiddenLine>
+            </a:ext>
+          </a:extLst>
+        </p:spPr>
+        <p:txBody>
+          <a:bodyPr>
+            <a:spAutoFit/>
+          </a:bodyPr>
+          <a:lstStyle>
+            <a:lvl1pPr>
+              <a:defRPr>
+                <a:solidFill>
+                  <a:schemeClr val="tx1"/>
+                </a:solidFill>
+                <a:latin typeface="Calibri" panose="020F0502020204030204" pitchFamily="34" charset="0"/>
+              </a:defRPr>
+            </a:lvl1pPr>
+            <a:lvl2pPr marL="742950" indent="-285750">
+              <a:defRPr>
+                <a:solidFill>
+                  <a:schemeClr val="tx1"/>
+                </a:solidFill>
+                <a:latin typeface="Calibri" panose="020F0502020204030204" pitchFamily="34" charset="0"/>
+              </a:defRPr>
+            </a:lvl2pPr>
+            <a:lvl3pPr marL="1143000" indent="-228600">
+              <a:defRPr>
+                <a:solidFill>
+                  <a:schemeClr val="tx1"/>
+                </a:solidFill>
+                <a:latin typeface="Calibri" panose="020F0502020204030204" pitchFamily="34" charset="0"/>
+              </a:defRPr>
+            </a:lvl3pPr>
+            <a:lvl4pPr marL="1600200" indent="-228600">
+              <a:defRPr>
+                <a:solidFill>
+                  <a:schemeClr val="tx1"/>
+                </a:solidFill>
+                <a:latin typeface="Calibri" panose="020F0502020204030204" pitchFamily="34" charset="0"/>
+              </a:defRPr>
+            </a:lvl4pPr>
+            <a:lvl5pPr marL="2057400" indent="-228600">
+              <a:defRPr>
+                <a:solidFill>
+                  <a:schemeClr val="tx1"/>
+                </a:solidFill>
+                <a:latin typeface="Calibri" panose="020F0502020204030204" pitchFamily="34" charset="0"/>
+              </a:defRPr>
+            </a:lvl5pPr>
+            <a:lvl6pPr marL="2514600" indent="-228600" eaLnBrk="0" fontAlgn="base" hangingPunct="0">
+              <a:spcBef>
+                <a:spcPct val="0"/>
+              </a:spcBef>
+              <a:spcAft>
+                <a:spcPct val="0"/>
+              </a:spcAft>
+              <a:defRPr>
+                <a:solidFill>
+                  <a:schemeClr val="tx1"/>
+                </a:solidFill>
+                <a:latin typeface="Calibri" panose="020F0502020204030204" pitchFamily="34" charset="0"/>
+              </a:defRPr>
+            </a:lvl6pPr>
+            <a:lvl7pPr marL="2971800" indent="-228600" eaLnBrk="0" fontAlgn="base" hangingPunct="0">
+              <a:spcBef>
+                <a:spcPct val="0"/>
+              </a:spcBef>
+              <a:spcAft>
+                <a:spcPct val="0"/>
+              </a:spcAft>
+              <a:defRPr>
+                <a:solidFill>
+                  <a:schemeClr val="tx1"/>
+                </a:solidFill>
+                <a:latin typeface="Calibri" panose="020F0502020204030204" pitchFamily="34" charset="0"/>
+              </a:defRPr>
+            </a:lvl7pPr>
+            <a:lvl8pPr marL="3429000" indent="-228600" eaLnBrk="0" fontAlgn="base" hangingPunct="0">
+              <a:spcBef>
+                <a:spcPct val="0"/>
+              </a:spcBef>
+              <a:spcAft>
+                <a:spcPct val="0"/>
+              </a:spcAft>
+              <a:defRPr>
+                <a:solidFill>
+                  <a:schemeClr val="tx1"/>
+                </a:solidFill>
+                <a:latin typeface="Calibri" panose="020F0502020204030204" pitchFamily="34" charset="0"/>
+              </a:defRPr>
+            </a:lvl8pPr>
+            <a:lvl9pPr marL="3886200" indent="-228600" eaLnBrk="0" fontAlgn="base" hangingPunct="0">
+              <a:spcBef>
+                <a:spcPct val="0"/>
+              </a:spcBef>
+              <a:spcAft>
+                <a:spcPct val="0"/>
+              </a:spcAft>
+              <a:defRPr>
+                <a:solidFill>
+                  <a:schemeClr val="tx1"/>
+                </a:solidFill>
+                <a:latin typeface="Calibri" panose="020F0502020204030204" pitchFamily="34" charset="0"/>
+              </a:defRPr>
+            </a:lvl9pPr>
+          </a:lstStyle>
+          <a:p>
+            <a:pPr algn="ctr" eaLnBrk="1" hangingPunct="1"/>
+            <a:r>
+              <a:rPr lang="en-US" altLang="en-US" sz="1200" dirty="0">
+                <a:latin typeface="Arial" panose="020B0604020202020204" pitchFamily="34" charset="0"/>
+                <a:ea typeface="Amazon Ember" panose="020B0603020204020204" pitchFamily="34" charset="0"/>
+                <a:cs typeface="Arial" panose="020B0604020202020204" pitchFamily="34" charset="0"/>
+              </a:rPr>
+              <a:t>AWS Lambda</a:t>
+            </a:r>
+          </a:p>
+        </p:txBody>
+      </p:sp>
+      <p:sp>
+        <p:nvSpPr>
+          <p:cNvPr id="14" name="TextBox 16">
+            <a:extLst>
+              <a:ext uri="{FF2B5EF4-FFF2-40B4-BE49-F238E27FC236}">
+                <a16:creationId xmlns:a16="http://schemas.microsoft.com/office/drawing/2014/main" id="{099D59F3-19A5-4E47-9AA1-612D0AD90909}"/>
+              </a:ext>
+            </a:extLst>
+          </p:cNvPr>
+          <p:cNvSpPr txBox="1">
+            <a:spLocks noChangeArrowheads="1"/>
+          </p:cNvSpPr>
+          <p:nvPr/>
+        </p:nvSpPr>
+        <p:spPr bwMode="auto">
+          <a:xfrm>
+            <a:off x="6373302" y="4181039"/>
+            <a:ext cx="1416034" cy="461665"/>
+          </a:xfrm>
+          <a:prstGeom prst="rect">
+            <a:avLst/>
+          </a:prstGeom>
+          <a:noFill/>
+          <a:ln>
+            <a:noFill/>
+          </a:ln>
+          <a:extLst>
+            <a:ext uri="{909E8E84-426E-40DD-AFC4-6F175D3DCCD1}">
+              <a14:hiddenFill xmlns:a14="http://schemas.microsoft.com/office/drawing/2010/main">
+                <a:solidFill>
+                  <a:srgbClr val="FFFFFF"/>
+                </a:solidFill>
+              </a14:hiddenFill>
+            </a:ext>
+            <a:ext uri="{91240B29-F687-4F45-9708-019B960494DF}">
+              <a14:hiddenLine xmlns:a14="http://schemas.microsoft.com/office/drawing/2010/main" w="9525">
+                <a:solidFill>
+                  <a:srgbClr val="000000"/>
+                </a:solidFill>
+                <a:miter lim="800000"/>
+                <a:headEnd/>
+                <a:tailEnd/>
+              </a14:hiddenLine>
+            </a:ext>
+          </a:extLst>
+        </p:spPr>
+        <p:txBody>
+          <a:bodyPr wrap="square">
+            <a:spAutoFit/>
+          </a:bodyPr>
+          <a:lstStyle>
+            <a:lvl1pPr>
+              <a:defRPr>
+                <a:solidFill>
+                  <a:schemeClr val="tx1"/>
+                </a:solidFill>
+                <a:latin typeface="Calibri" panose="020F0502020204030204" pitchFamily="34" charset="0"/>
+              </a:defRPr>
+            </a:lvl1pPr>
+            <a:lvl2pPr marL="742950" indent="-285750">
+              <a:defRPr>
+                <a:solidFill>
+                  <a:schemeClr val="tx1"/>
+                </a:solidFill>
+                <a:latin typeface="Calibri" panose="020F0502020204030204" pitchFamily="34" charset="0"/>
+              </a:defRPr>
+            </a:lvl2pPr>
+            <a:lvl3pPr marL="1143000" indent="-228600">
+              <a:defRPr>
+                <a:solidFill>
+                  <a:schemeClr val="tx1"/>
+                </a:solidFill>
+                <a:latin typeface="Calibri" panose="020F0502020204030204" pitchFamily="34" charset="0"/>
+              </a:defRPr>
+            </a:lvl3pPr>
+            <a:lvl4pPr marL="1600200" indent="-228600">
+              <a:defRPr>
+                <a:solidFill>
+                  <a:schemeClr val="tx1"/>
+                </a:solidFill>
+                <a:latin typeface="Calibri" panose="020F0502020204030204" pitchFamily="34" charset="0"/>
+              </a:defRPr>
+            </a:lvl4pPr>
+            <a:lvl5pPr marL="2057400" indent="-228600">
+              <a:defRPr>
+                <a:solidFill>
+                  <a:schemeClr val="tx1"/>
+                </a:solidFill>
+                <a:latin typeface="Calibri" panose="020F0502020204030204" pitchFamily="34" charset="0"/>
+              </a:defRPr>
+            </a:lvl5pPr>
+            <a:lvl6pPr marL="2514600" indent="-228600" eaLnBrk="0" fontAlgn="base" hangingPunct="0">
+              <a:spcBef>
+                <a:spcPct val="0"/>
+              </a:spcBef>
+              <a:spcAft>
+                <a:spcPct val="0"/>
+              </a:spcAft>
+              <a:defRPr>
+                <a:solidFill>
+                  <a:schemeClr val="tx1"/>
+                </a:solidFill>
+                <a:latin typeface="Calibri" panose="020F0502020204030204" pitchFamily="34" charset="0"/>
+              </a:defRPr>
+            </a:lvl6pPr>
+            <a:lvl7pPr marL="2971800" indent="-228600" eaLnBrk="0" fontAlgn="base" hangingPunct="0">
+              <a:spcBef>
+                <a:spcPct val="0"/>
+              </a:spcBef>
+              <a:spcAft>
+                <a:spcPct val="0"/>
+              </a:spcAft>
+              <a:defRPr>
+                <a:solidFill>
+                  <a:schemeClr val="tx1"/>
+                </a:solidFill>
+                <a:latin typeface="Calibri" panose="020F0502020204030204" pitchFamily="34" charset="0"/>
+              </a:defRPr>
+            </a:lvl7pPr>
+            <a:lvl8pPr marL="3429000" indent="-228600" eaLnBrk="0" fontAlgn="base" hangingPunct="0">
+              <a:spcBef>
+                <a:spcPct val="0"/>
+              </a:spcBef>
+              <a:spcAft>
+                <a:spcPct val="0"/>
+              </a:spcAft>
+              <a:defRPr>
+                <a:solidFill>
+                  <a:schemeClr val="tx1"/>
+                </a:solidFill>
+                <a:latin typeface="Calibri" panose="020F0502020204030204" pitchFamily="34" charset="0"/>
+              </a:defRPr>
+            </a:lvl8pPr>
+            <a:lvl9pPr marL="3886200" indent="-228600" eaLnBrk="0" fontAlgn="base" hangingPunct="0">
+              <a:spcBef>
+                <a:spcPct val="0"/>
+              </a:spcBef>
+              <a:spcAft>
+                <a:spcPct val="0"/>
+              </a:spcAft>
+              <a:defRPr>
+                <a:solidFill>
+                  <a:schemeClr val="tx1"/>
+                </a:solidFill>
+                <a:latin typeface="Calibri" panose="020F0502020204030204" pitchFamily="34" charset="0"/>
+              </a:defRPr>
+            </a:lvl9pPr>
+          </a:lstStyle>
+          <a:p>
+            <a:pPr algn="ctr" eaLnBrk="1" hangingPunct="1"/>
+            <a:r>
+              <a:rPr lang="en-US" altLang="en-US" sz="1200" dirty="0" smtClean="0">
+                <a:latin typeface="Arial" panose="020B0604020202020204" pitchFamily="34" charset="0"/>
+                <a:ea typeface="Amazon Ember" panose="020B0603020204020204" pitchFamily="34" charset="0"/>
+                <a:cs typeface="Arial" panose="020B0604020202020204" pitchFamily="34" charset="0"/>
+              </a:rPr>
+              <a:t>Selling partner API endpoints</a:t>
+            </a:r>
+            <a:endParaRPr lang="en-US" altLang="en-US" sz="1200" dirty="0">
+              <a:latin typeface="Arial" panose="020B0604020202020204" pitchFamily="34" charset="0"/>
+              <a:ea typeface="Amazon Ember" panose="020B0603020204020204" pitchFamily="34" charset="0"/>
+              <a:cs typeface="Arial" panose="020B0604020202020204" pitchFamily="34" charset="0"/>
+            </a:endParaRPr>
+          </a:p>
+        </p:txBody>
+      </p:sp>
+      <p:pic>
+        <p:nvPicPr>
+          <p:cNvPr id="15" name="Graphic 6">
+            <a:extLst>
+              <a:ext uri="{FF2B5EF4-FFF2-40B4-BE49-F238E27FC236}">
+                <a16:creationId xmlns:a16="http://schemas.microsoft.com/office/drawing/2014/main" id="{FD960BCD-0D1F-914A-B9E9-229CD74E312A}"/>
+              </a:ext>
+            </a:extLst>
+          </p:cNvPr>
+          <p:cNvPicPr>
+            <a:picLocks noChangeAspect="1" noChangeArrowheads="1"/>
+          </p:cNvPicPr>
+          <p:nvPr/>
+        </p:nvPicPr>
+        <p:blipFill>
+          <a:blip r:embed="rId11">
+            <a:extLst>
+              <a:ext uri="{96DAC541-7B7A-43D3-8B79-37D633B846F1}">
+                <asvg:svgBlip xmlns:asvg="http://schemas.microsoft.com/office/drawing/2016/SVG/main" xmlns="" r:embed="rId13"/>
+              </a:ext>
+            </a:extLst>
+          </a:blip>
+          <a:srcRect/>
+          <a:stretch/>
+        </p:blipFill>
+        <p:spPr bwMode="auto">
+          <a:xfrm>
+            <a:off x="6859052" y="3735295"/>
+            <a:ext cx="457200" cy="457200"/>
+          </a:xfrm>
+          <a:prstGeom prst="rect">
+            <a:avLst/>
+          </a:prstGeom>
+          <a:noFill/>
+          <a:ln>
+            <a:noFill/>
+          </a:ln>
+          <a:extLst>
+            <a:ext uri="{909E8E84-426E-40DD-AFC4-6F175D3DCCD1}">
+              <a14:hiddenFill xmlns:a14="http://schemas.microsoft.com/office/drawing/2010/main">
+                <a:solidFill>
+                  <a:srgbClr val="FFFFFF"/>
+                </a:solidFill>
+              </a14:hiddenFill>
+            </a:ext>
+            <a:ext uri="{91240B29-F687-4F45-9708-019B960494DF}">
+              <a14:hiddenLine xmlns:a14="http://schemas.microsoft.com/office/drawing/2010/main" w="9525">
+                <a:solidFill>
+                  <a:srgbClr val="000000"/>
+                </a:solidFill>
+                <a:miter lim="800000"/>
+                <a:headEnd/>
+                <a:tailEnd/>
+              </a14:hiddenLine>
+            </a:ext>
+          </a:extLst>
+        </p:spPr>
+      </p:pic>
+      <p:pic>
+        <p:nvPicPr>
+          <p:cNvPr id="16" name="Graphic 23">
+            <a:extLst>
+              <a:ext uri="{FF2B5EF4-FFF2-40B4-BE49-F238E27FC236}">
+                <a16:creationId xmlns:a16="http://schemas.microsoft.com/office/drawing/2014/main" id="{E51D7DF0-B100-3848-9343-103AD16633D0}"/>
+              </a:ext>
+            </a:extLst>
+          </p:cNvPr>
+          <p:cNvPicPr>
+            <a:picLocks noChangeAspect="1" noChangeArrowheads="1"/>
+          </p:cNvPicPr>
+          <p:nvPr/>
+        </p:nvPicPr>
+        <p:blipFill>
+          <a:blip r:embed="rId14">
+            <a:extLst>
+              <a:ext uri="{96DAC541-7B7A-43D3-8B79-37D633B846F1}">
+                <asvg:svgBlip xmlns:asvg="http://schemas.microsoft.com/office/drawing/2016/SVG/main" xmlns="" r:embed="rId22"/>
+              </a:ext>
+            </a:extLst>
+          </a:blip>
+          <a:srcRect/>
+          <a:stretch/>
+        </p:blipFill>
+        <p:spPr bwMode="auto">
+          <a:xfrm flipH="1">
+            <a:off x="1202405" y="2767964"/>
+            <a:ext cx="469900" cy="469900"/>
+          </a:xfrm>
+          <a:prstGeom prst="rect">
+            <a:avLst/>
+          </a:prstGeom>
+          <a:noFill/>
+          <a:ln>
+            <a:noFill/>
+          </a:ln>
+          <a:extLst>
+            <a:ext uri="{909E8E84-426E-40DD-AFC4-6F175D3DCCD1}">
+              <a14:hiddenFill xmlns:a14="http://schemas.microsoft.com/office/drawing/2010/main">
+                <a:solidFill>
+                  <a:srgbClr val="FFFFFF"/>
+                </a:solidFill>
+              </a14:hiddenFill>
+            </a:ext>
+            <a:ext uri="{91240B29-F687-4F45-9708-019B960494DF}">
+              <a14:hiddenLine xmlns:a14="http://schemas.microsoft.com/office/drawing/2010/main" w="9525">
+                <a:solidFill>
+                  <a:srgbClr val="000000"/>
+                </a:solidFill>
+                <a:miter lim="800000"/>
+                <a:headEnd/>
+                <a:tailEnd/>
+              </a14:hiddenLine>
+            </a:ext>
+          </a:extLst>
+        </p:spPr>
+      </p:pic>
+      <p:sp>
+        <p:nvSpPr>
+          <p:cNvPr id="17" name="TextBox 40">
+            <a:extLst>
+              <a:ext uri="{FF2B5EF4-FFF2-40B4-BE49-F238E27FC236}">
+                <a16:creationId xmlns:a16="http://schemas.microsoft.com/office/drawing/2014/main" id="{1DE0395A-A8FC-1C4D-B0B2-B8432D85D102}"/>
+              </a:ext>
+            </a:extLst>
+          </p:cNvPr>
+          <p:cNvSpPr txBox="1">
+            <a:spLocks noChangeArrowheads="1"/>
+          </p:cNvSpPr>
+          <p:nvPr/>
+        </p:nvSpPr>
+        <p:spPr bwMode="auto">
+          <a:xfrm>
+            <a:off x="900780" y="3369453"/>
+            <a:ext cx="1073150" cy="261610"/>
+          </a:xfrm>
+          <a:prstGeom prst="rect">
+            <a:avLst/>
+          </a:prstGeom>
+          <a:noFill/>
+          <a:ln>
+            <a:noFill/>
+          </a:ln>
+          <a:extLst>
+            <a:ext uri="{909E8E84-426E-40DD-AFC4-6F175D3DCCD1}">
+              <a14:hiddenFill xmlns:a14="http://schemas.microsoft.com/office/drawing/2010/main">
+                <a:solidFill>
+                  <a:srgbClr val="FFFFFF"/>
+                </a:solidFill>
+              </a14:hiddenFill>
+            </a:ext>
+            <a:ext uri="{91240B29-F687-4F45-9708-019B960494DF}">
+              <a14:hiddenLine xmlns:a14="http://schemas.microsoft.com/office/drawing/2010/main" w="9525">
+                <a:solidFill>
+                  <a:srgbClr val="000000"/>
+                </a:solidFill>
+                <a:miter lim="800000"/>
+                <a:headEnd/>
+                <a:tailEnd/>
+              </a14:hiddenLine>
+            </a:ext>
+          </a:extLst>
+        </p:spPr>
+        <p:txBody>
+          <a:bodyPr>
+            <a:spAutoFit/>
+          </a:bodyPr>
+          <a:lstStyle>
+            <a:lvl1pPr>
+              <a:defRPr>
+                <a:solidFill>
+                  <a:schemeClr val="tx1"/>
+                </a:solidFill>
+                <a:latin typeface="Calibri" panose="020F0502020204030204" pitchFamily="34" charset="0"/>
+              </a:defRPr>
+            </a:lvl1pPr>
+            <a:lvl2pPr marL="742950" indent="-285750">
+              <a:defRPr>
+                <a:solidFill>
+                  <a:schemeClr val="tx1"/>
+                </a:solidFill>
+                <a:latin typeface="Calibri" panose="020F0502020204030204" pitchFamily="34" charset="0"/>
+              </a:defRPr>
+            </a:lvl2pPr>
+            <a:lvl3pPr marL="1143000" indent="-228600">
+              <a:defRPr>
+                <a:solidFill>
+                  <a:schemeClr val="tx1"/>
+                </a:solidFill>
+                <a:latin typeface="Calibri" panose="020F0502020204030204" pitchFamily="34" charset="0"/>
+              </a:defRPr>
+            </a:lvl3pPr>
+            <a:lvl4pPr marL="1600200" indent="-228600">
+              <a:defRPr>
+                <a:solidFill>
+                  <a:schemeClr val="tx1"/>
+                </a:solidFill>
+                <a:latin typeface="Calibri" panose="020F0502020204030204" pitchFamily="34" charset="0"/>
+              </a:defRPr>
+            </a:lvl4pPr>
+            <a:lvl5pPr marL="2057400" indent="-228600">
+              <a:defRPr>
+                <a:solidFill>
+                  <a:schemeClr val="tx1"/>
+                </a:solidFill>
+                <a:latin typeface="Calibri" panose="020F0502020204030204" pitchFamily="34" charset="0"/>
+              </a:defRPr>
+            </a:lvl5pPr>
+            <a:lvl6pPr marL="2514600" indent="-228600" eaLnBrk="0" fontAlgn="base" hangingPunct="0">
+              <a:spcBef>
+                <a:spcPct val="0"/>
+              </a:spcBef>
+              <a:spcAft>
+                <a:spcPct val="0"/>
+              </a:spcAft>
+              <a:defRPr>
+                <a:solidFill>
+                  <a:schemeClr val="tx1"/>
+                </a:solidFill>
+                <a:latin typeface="Calibri" panose="020F0502020204030204" pitchFamily="34" charset="0"/>
+              </a:defRPr>
+            </a:lvl6pPr>
+            <a:lvl7pPr marL="2971800" indent="-228600" eaLnBrk="0" fontAlgn="base" hangingPunct="0">
+              <a:spcBef>
+                <a:spcPct val="0"/>
+              </a:spcBef>
+              <a:spcAft>
+                <a:spcPct val="0"/>
+              </a:spcAft>
+              <a:defRPr>
+                <a:solidFill>
+                  <a:schemeClr val="tx1"/>
+                </a:solidFill>
+                <a:latin typeface="Calibri" panose="020F0502020204030204" pitchFamily="34" charset="0"/>
+              </a:defRPr>
+            </a:lvl7pPr>
+            <a:lvl8pPr marL="3429000" indent="-228600" eaLnBrk="0" fontAlgn="base" hangingPunct="0">
+              <a:spcBef>
+                <a:spcPct val="0"/>
+              </a:spcBef>
+              <a:spcAft>
+                <a:spcPct val="0"/>
+              </a:spcAft>
+              <a:defRPr>
+                <a:solidFill>
+                  <a:schemeClr val="tx1"/>
+                </a:solidFill>
+                <a:latin typeface="Calibri" panose="020F0502020204030204" pitchFamily="34" charset="0"/>
+              </a:defRPr>
+            </a:lvl8pPr>
+            <a:lvl9pPr marL="3886200" indent="-228600" eaLnBrk="0" fontAlgn="base" hangingPunct="0">
+              <a:spcBef>
+                <a:spcPct val="0"/>
+              </a:spcBef>
+              <a:spcAft>
+                <a:spcPct val="0"/>
+              </a:spcAft>
+              <a:defRPr>
+                <a:solidFill>
+                  <a:schemeClr val="tx1"/>
+                </a:solidFill>
+                <a:latin typeface="Calibri" panose="020F0502020204030204" pitchFamily="34" charset="0"/>
+              </a:defRPr>
+            </a:lvl9pPr>
+          </a:lstStyle>
+          <a:p>
+            <a:pPr algn="ctr" eaLnBrk="1" hangingPunct="1"/>
+            <a:r>
+              <a:rPr lang="en-US" altLang="en-US" sz="1100" dirty="0">
+                <a:solidFill>
+                  <a:srgbClr val="000000"/>
+                </a:solidFill>
+                <a:latin typeface="Arial" panose="020B0604020202020204" pitchFamily="34" charset="0"/>
+                <a:cs typeface="Arial" panose="020B0604020202020204" pitchFamily="34" charset="0"/>
+              </a:rPr>
+              <a:t>Users</a:t>
+            </a:r>
+          </a:p>
+        </p:txBody>
+      </p:sp>
+      <p:cxnSp>
+        <p:nvCxnSpPr>
+          <p:cNvPr id="18" name="Straight Arrow Connector 17">
+            <a:extLst>
+              <a:ext uri="{FF2B5EF4-FFF2-40B4-BE49-F238E27FC236}">
+                <a16:creationId xmlns:a16="http://schemas.microsoft.com/office/drawing/2014/main" id="{9E8BEF15-E8C4-2242-949A-672EF8C74E91}"/>
+              </a:ext>
+            </a:extLst>
+          </p:cNvPr>
+          <p:cNvCxnSpPr>
+            <a:cxnSpLocks/>
+            <a:stCxn id="16" idx="1"/>
+            <a:endCxn id="6" idx="1"/>
+          </p:cNvCxnSpPr>
+          <p:nvPr/>
+        </p:nvCxnSpPr>
+        <p:spPr>
+          <a:xfrm>
+            <a:off x="1672305" y="3002914"/>
+            <a:ext cx="1049338" cy="0"/>
+          </a:xfrm>
+          <a:prstGeom prst="straightConnector1">
+            <a:avLst/>
+          </a:prstGeom>
+          <a:ln w="12700">
+            <a:solidFill>
+              <a:srgbClr val="545B64"/>
+            </a:solidFill>
+            <a:headEnd type="none" w="med" len="sm"/>
+            <a:tailEnd type="arrow" w="med" len="sm"/>
+          </a:ln>
+        </p:spPr>
+        <p:style>
+          <a:lnRef idx="1">
+            <a:schemeClr val="accent1"/>
+          </a:lnRef>
+          <a:fillRef idx="0">
+            <a:schemeClr val="accent1"/>
+          </a:fillRef>
+          <a:effectRef idx="0">
+            <a:schemeClr val="accent1"/>
+          </a:effectRef>
+          <a:fontRef idx="minor">
+            <a:schemeClr val="tx1"/>
+          </a:fontRef>
+        </p:style>
+      </p:cxnSp>
+      <p:sp>
+        <p:nvSpPr>
+          <p:cNvPr id="20" name="Freeform 19">
+            <a:extLst>
+              <a:ext uri="{FF2B5EF4-FFF2-40B4-BE49-F238E27FC236}">
+                <a16:creationId xmlns:a16="http://schemas.microsoft.com/office/drawing/2014/main" id="{5A63A47A-4922-D048-93AE-8AEE5D4BE271}"/>
+              </a:ext>
+            </a:extLst>
+          </p:cNvPr>
+          <p:cNvSpPr/>
+          <p:nvPr/>
+        </p:nvSpPr>
+        <p:spPr bwMode="auto">
+          <a:xfrm rot="10800000">
+            <a:off x="4163624" y="2027287"/>
+            <a:ext cx="914400" cy="1936608"/>
+          </a:xfrm>
+          <a:custGeom>
+            <a:avLst/>
+            <a:gdLst>
+              <a:gd name="connsiteX0" fmla="*/ 0 w 622300"/>
+              <a:gd name="connsiteY0" fmla="*/ 0 h 1574800"/>
+              <a:gd name="connsiteX1" fmla="*/ 622300 w 622300"/>
+              <a:gd name="connsiteY1" fmla="*/ 0 h 1574800"/>
+              <a:gd name="connsiteX2" fmla="*/ 622300 w 622300"/>
+              <a:gd name="connsiteY2" fmla="*/ 1574800 h 1574800"/>
+              <a:gd name="connsiteX3" fmla="*/ 482600 w 622300"/>
+              <a:gd name="connsiteY3" fmla="*/ 1574800 h 1574800"/>
+              <a:gd name="connsiteX4" fmla="*/ 0 w 622300"/>
+              <a:gd name="connsiteY4" fmla="*/ 1574800 h 1574800"/>
+            </a:gdLst>
+            <a:ahLst/>
+            <a:cxnLst>
+              <a:cxn ang="0">
+                <a:pos x="connsiteX0" y="connsiteY0"/>
+              </a:cxn>
+              <a:cxn ang="0">
+                <a:pos x="connsiteX1" y="connsiteY1"/>
+              </a:cxn>
+              <a:cxn ang="0">
+                <a:pos x="connsiteX2" y="connsiteY2"/>
+              </a:cxn>
+              <a:cxn ang="0">
+                <a:pos x="connsiteX3" y="connsiteY3"/>
+              </a:cxn>
+              <a:cxn ang="0">
+                <a:pos x="connsiteX4" y="connsiteY4"/>
+              </a:cxn>
+            </a:cxnLst>
+            <a:rect l="l" t="t" r="r" b="b"/>
+            <a:pathLst>
+              <a:path w="622300" h="1574800">
+                <a:moveTo>
+                  <a:pt x="0" y="0"/>
+                </a:moveTo>
+                <a:lnTo>
+                  <a:pt x="622300" y="0"/>
+                </a:lnTo>
+                <a:lnTo>
+                  <a:pt x="622300" y="1574800"/>
+                </a:lnTo>
+                <a:lnTo>
+                  <a:pt x="482600" y="1574800"/>
+                </a:lnTo>
+                <a:lnTo>
+                  <a:pt x="0" y="1574800"/>
+                </a:lnTo>
+              </a:path>
+            </a:pathLst>
+          </a:custGeom>
+          <a:noFill/>
+          <a:ln w="12700">
+            <a:solidFill>
+              <a:schemeClr val="tx2"/>
+            </a:solidFill>
+            <a:headEnd type="arrow" w="med" len="sm"/>
+            <a:tailEnd type="arrow" w="med" len="sm"/>
+          </a:ln>
+        </p:spPr>
+        <p:style>
+          <a:lnRef idx="2">
+            <a:schemeClr val="accent1">
+              <a:shade val="50000"/>
+            </a:schemeClr>
+          </a:lnRef>
+          <a:fillRef idx="1">
+            <a:schemeClr val="accent1"/>
+          </a:fillRef>
+          <a:effectRef idx="0">
+            <a:schemeClr val="accent1"/>
+          </a:effectRef>
+          <a:fontRef idx="minor">
+            <a:schemeClr val="lt1"/>
+          </a:fontRef>
+        </p:style>
+        <p:txBody>
+          <a:bodyPr anchor="ctr"/>
+          <a:lstStyle/>
+          <a:p>
+            <a:pPr algn="ctr" eaLnBrk="1" fontAlgn="auto" hangingPunct="1">
+              <a:spcBef>
+                <a:spcPts val="0"/>
+              </a:spcBef>
+              <a:spcAft>
+                <a:spcPts val="0"/>
+              </a:spcAft>
+              <a:defRPr/>
+            </a:pPr>
+            <a:endParaRPr lang="en-US" dirty="0"/>
+          </a:p>
+        </p:txBody>
+      </p:sp>
+      <p:cxnSp>
+        <p:nvCxnSpPr>
+          <p:cNvPr id="21" name="Straight Arrow Connector 20">
+            <a:extLst>
+              <a:ext uri="{FF2B5EF4-FFF2-40B4-BE49-F238E27FC236}">
+                <a16:creationId xmlns:a16="http://schemas.microsoft.com/office/drawing/2014/main" id="{039E7995-43D5-3943-BB09-527E226ECF2B}"/>
+              </a:ext>
+            </a:extLst>
+          </p:cNvPr>
+          <p:cNvCxnSpPr>
+            <a:cxnSpLocks/>
+            <a:stCxn id="6" idx="3"/>
+          </p:cNvCxnSpPr>
+          <p:nvPr/>
+        </p:nvCxnSpPr>
+        <p:spPr bwMode="auto">
+          <a:xfrm>
+            <a:off x="3483643" y="3002914"/>
+            <a:ext cx="679980" cy="0"/>
+          </a:xfrm>
+          <a:prstGeom prst="straightConnector1">
+            <a:avLst/>
+          </a:prstGeom>
+          <a:ln w="12700">
+            <a:solidFill>
+              <a:srgbClr val="545B64"/>
+            </a:solidFill>
+            <a:headEnd type="none" w="med" len="sm"/>
+            <a:tailEnd type="none" w="med" len="sm"/>
+          </a:ln>
+        </p:spPr>
+        <p:style>
+          <a:lnRef idx="1">
+            <a:schemeClr val="accent1"/>
+          </a:lnRef>
+          <a:fillRef idx="0">
+            <a:schemeClr val="accent1"/>
+          </a:fillRef>
+          <a:effectRef idx="0">
+            <a:schemeClr val="accent1"/>
+          </a:effectRef>
+          <a:fontRef idx="minor">
+            <a:schemeClr val="tx1"/>
+          </a:fontRef>
+        </p:style>
+      </p:cxnSp>
+      <p:cxnSp>
+        <p:nvCxnSpPr>
+          <p:cNvPr id="27" name="Straight Arrow Connector 26">
+            <a:extLst>
+              <a:ext uri="{FF2B5EF4-FFF2-40B4-BE49-F238E27FC236}">
+                <a16:creationId xmlns:a16="http://schemas.microsoft.com/office/drawing/2014/main" id="{9E8BEF15-E8C4-2242-949A-672EF8C74E91}"/>
+              </a:ext>
+            </a:extLst>
+          </p:cNvPr>
+          <p:cNvCxnSpPr>
+            <a:cxnSpLocks/>
+            <a:stCxn id="12" idx="3"/>
+            <a:endCxn id="15" idx="1"/>
+          </p:cNvCxnSpPr>
+          <p:nvPr/>
+        </p:nvCxnSpPr>
+        <p:spPr>
+          <a:xfrm>
+            <a:off x="5861053" y="3957545"/>
+            <a:ext cx="997999" cy="6350"/>
+          </a:xfrm>
+          <a:prstGeom prst="straightConnector1">
+            <a:avLst/>
+          </a:prstGeom>
+          <a:ln w="12700">
+            <a:solidFill>
+              <a:srgbClr val="545B64"/>
+            </a:solidFill>
+            <a:headEnd type="none" w="med" len="sm"/>
+            <a:tailEnd type="arrow" w="med" len="sm"/>
+          </a:ln>
+        </p:spPr>
+        <p:style>
+          <a:lnRef idx="1">
+            <a:schemeClr val="accent1"/>
+          </a:lnRef>
+          <a:fillRef idx="0">
+            <a:schemeClr val="accent1"/>
+          </a:fillRef>
+          <a:effectRef idx="0">
+            <a:schemeClr val="accent1"/>
+          </a:effectRef>
+          <a:fontRef idx="minor">
+            <a:schemeClr val="tx1"/>
+          </a:fontRef>
+        </p:style>
+      </p:cxnSp>
+      <p:cxnSp>
+        <p:nvCxnSpPr>
+          <p:cNvPr id="22" name="Straight Arrow Connector 21">
+            <a:extLst>
+              <a:ext uri="{FF2B5EF4-FFF2-40B4-BE49-F238E27FC236}">
+                <a16:creationId xmlns:a16="http://schemas.microsoft.com/office/drawing/2014/main" id="{5A9D33BB-F7AF-C044-9BA5-6F98953C5C41}"/>
+              </a:ext>
+            </a:extLst>
+          </p:cNvPr>
+          <p:cNvCxnSpPr>
+            <a:stCxn id="12" idx="0"/>
+            <a:endCxn id="10" idx="2"/>
+          </p:cNvCxnSpPr>
+          <p:nvPr/>
+        </p:nvCxnSpPr>
+        <p:spPr>
+          <a:xfrm flipV="1">
+            <a:off x="5480053" y="2415209"/>
+            <a:ext cx="1" cy="1161336"/>
+          </a:xfrm>
+          <a:prstGeom prst="straightConnector1">
+            <a:avLst/>
+          </a:prstGeom>
+          <a:ln w="12700">
+            <a:solidFill>
+              <a:schemeClr val="tx2"/>
+            </a:solidFill>
+            <a:headEnd type="arrow" w="med" len="sm"/>
+            <a:tailEnd type="none" w="med" len="sm"/>
+          </a:ln>
+        </p:spPr>
+        <p:style>
+          <a:lnRef idx="1">
+            <a:schemeClr val="accent1"/>
+          </a:lnRef>
+          <a:fillRef idx="0">
+            <a:schemeClr val="accent1"/>
+          </a:fillRef>
+          <a:effectRef idx="0">
+            <a:schemeClr val="accent1"/>
+          </a:effectRef>
+          <a:fontRef idx="minor">
+            <a:schemeClr val="tx1"/>
+          </a:fontRef>
+        </p:style>
+      </p:cxnSp>
+    </p:spTree>
+    <p:extLst>
+      <p:ext uri="{BB962C8B-B14F-4D97-AF65-F5344CB8AC3E}">
+        <p14:creationId xmlns:p14="http://schemas.microsoft.com/office/powerpoint/2010/main" val="165401706"/>
+      </p:ext>
+    </p:extLst>
+  </p:cSld>
+  <p:clrMapOvr>
+    <a:masterClrMapping/>
+  </p:clrMapOvr>
+</p:sld>
+</file>
+
+<file path=ppt/slides/slide3.xml><?xml version="1.0" encoding="utf-8"?>
+<p:sld xmlns:a="http://schemas.openxmlformats.org/drawingml/2006/main" xmlns:r="http://schemas.openxmlformats.org/officeDocument/2006/relationships" xmlns:p="http://schemas.openxmlformats.org/presentationml/2006/main">
+  <p:cSld>
+    <p:spTree>
+      <p:nvGrpSpPr>
+        <p:cNvPr id="1" name=""/>
+        <p:cNvGrpSpPr/>
+        <p:nvPr/>
+      </p:nvGrpSpPr>
+      <p:grpSpPr>
+        <a:xfrm>
+          <a:off x="0" y="0"/>
+          <a:ext cx="0" cy="0"/>
+          <a:chOff x="0" y="0"/>
+          <a:chExt cx="0" cy="0"/>
+        </a:xfrm>
+      </p:grpSpPr>
+      <p:sp>
+        <p:nvSpPr>
+          <p:cNvPr id="4" name="Rectangle 3">
+            <a:extLst>
+              <a:ext uri="{FF2B5EF4-FFF2-40B4-BE49-F238E27FC236}">
+                <a16:creationId xmlns:a16="http://schemas.microsoft.com/office/drawing/2014/main" id="{E3C373A7-C79E-F040-A456-79E6A4AF1C21}"/>
+              </a:ext>
+            </a:extLst>
+          </p:cNvPr>
+          <p:cNvSpPr/>
+          <p:nvPr/>
+        </p:nvSpPr>
+        <p:spPr>
+          <a:xfrm>
+            <a:off x="4577032" y="2057400"/>
+            <a:ext cx="1806043" cy="2895599"/>
+          </a:xfrm>
+          <a:prstGeom prst="rect">
+            <a:avLst/>
+          </a:prstGeom>
+          <a:noFill/>
+          <a:ln w="12700">
+            <a:solidFill>
+              <a:schemeClr val="tx1"/>
+            </a:solidFill>
+          </a:ln>
+        </p:spPr>
+        <p:style>
+          <a:lnRef idx="2">
+            <a:schemeClr val="accent1">
+              <a:shade val="50000"/>
+            </a:schemeClr>
+          </a:lnRef>
+          <a:fillRef idx="1">
+            <a:schemeClr val="accent1"/>
+          </a:fillRef>
+          <a:effectRef idx="0">
+            <a:schemeClr val="accent1"/>
+          </a:effectRef>
+          <a:fontRef idx="minor">
+            <a:schemeClr val="lt1"/>
+          </a:fontRef>
+        </p:style>
+        <p:txBody>
+          <a:bodyPr lIns="502920" tIns="91440"/>
+          <a:lstStyle/>
+          <a:p>
+            <a:pPr eaLnBrk="1" fontAlgn="auto" hangingPunct="1">
+              <a:spcBef>
+                <a:spcPts val="0"/>
+              </a:spcBef>
+              <a:spcAft>
+                <a:spcPts val="0"/>
+              </a:spcAft>
+              <a:defRPr/>
+            </a:pPr>
+            <a:r>
+              <a:rPr lang="en-US" sz="1200" dirty="0">
+                <a:solidFill>
+                  <a:sysClr val="windowText" lastClr="000000"/>
+                </a:solidFill>
+                <a:latin typeface="Arial" panose="020B0604020202020204" pitchFamily="34" charset="0"/>
+                <a:cs typeface="Arial" panose="020B0604020202020204" pitchFamily="34" charset="0"/>
+              </a:rPr>
+              <a:t>AWS Cloud</a:t>
+            </a:r>
+          </a:p>
+        </p:txBody>
+      </p:sp>
+      <p:pic>
+        <p:nvPicPr>
+          <p:cNvPr id="5" name="Graphic 33">
+            <a:extLst>
+              <a:ext uri="{FF2B5EF4-FFF2-40B4-BE49-F238E27FC236}">
+                <a16:creationId xmlns:a16="http://schemas.microsoft.com/office/drawing/2014/main" id="{698D4BC3-E737-F248-BFA7-23A251040C64}"/>
+              </a:ext>
+            </a:extLst>
+          </p:cNvPr>
+          <p:cNvPicPr>
+            <a:picLocks noChangeAspect="1"/>
+          </p:cNvPicPr>
+          <p:nvPr/>
+        </p:nvPicPr>
+        <p:blipFill>
+          <a:blip r:embed="rId2">
+            <a:extLst>
+              <a:ext uri="{96DAC541-7B7A-43D3-8B79-37D633B846F1}">
+                <asvg:svgBlip xmlns:asvg="http://schemas.microsoft.com/office/drawing/2016/SVG/main" xmlns="" r:embed="rId7"/>
+              </a:ext>
+            </a:extLst>
+          </a:blip>
+          <a:srcRect/>
+          <a:stretch/>
+        </p:blipFill>
+        <p:spPr>
+          <a:xfrm>
+            <a:off x="4577032" y="2057400"/>
+            <a:ext cx="381000" cy="381000"/>
+          </a:xfrm>
+          <a:prstGeom prst="rect">
+            <a:avLst/>
+          </a:prstGeom>
+        </p:spPr>
+      </p:pic>
+      <p:sp>
+        <p:nvSpPr>
+          <p:cNvPr id="14" name="TextBox 16">
+            <a:extLst>
+              <a:ext uri="{FF2B5EF4-FFF2-40B4-BE49-F238E27FC236}">
+                <a16:creationId xmlns:a16="http://schemas.microsoft.com/office/drawing/2014/main" id="{099D59F3-19A5-4E47-9AA1-612D0AD90909}"/>
+              </a:ext>
+            </a:extLst>
+          </p:cNvPr>
+          <p:cNvSpPr txBox="1">
+            <a:spLocks noChangeArrowheads="1"/>
+          </p:cNvSpPr>
+          <p:nvPr/>
+        </p:nvSpPr>
+        <p:spPr bwMode="auto">
+          <a:xfrm>
+            <a:off x="6347901" y="4181039"/>
+            <a:ext cx="1475298" cy="461665"/>
+          </a:xfrm>
+          <a:prstGeom prst="rect">
+            <a:avLst/>
+          </a:prstGeom>
+          <a:noFill/>
+          <a:ln>
+            <a:noFill/>
+          </a:ln>
+          <a:extLst>
+            <a:ext uri="{909E8E84-426E-40DD-AFC4-6F175D3DCCD1}">
+              <a14:hiddenFill xmlns:a14="http://schemas.microsoft.com/office/drawing/2010/main">
+                <a:solidFill>
+                  <a:srgbClr val="FFFFFF"/>
+                </a:solidFill>
+              </a14:hiddenFill>
+            </a:ext>
+            <a:ext uri="{91240B29-F687-4F45-9708-019B960494DF}">
+              <a14:hiddenLine xmlns:a14="http://schemas.microsoft.com/office/drawing/2010/main" w="9525">
+                <a:solidFill>
+                  <a:srgbClr val="000000"/>
+                </a:solidFill>
+                <a:miter lim="800000"/>
+                <a:headEnd/>
+                <a:tailEnd/>
+              </a14:hiddenLine>
+            </a:ext>
+          </a:extLst>
+        </p:spPr>
+        <p:txBody>
+          <a:bodyPr wrap="square">
+            <a:spAutoFit/>
+          </a:bodyPr>
+          <a:lstStyle>
+            <a:lvl1pPr>
+              <a:defRPr>
+                <a:solidFill>
+                  <a:schemeClr val="tx1"/>
+                </a:solidFill>
+                <a:latin typeface="Calibri" panose="020F0502020204030204" pitchFamily="34" charset="0"/>
+              </a:defRPr>
+            </a:lvl1pPr>
+            <a:lvl2pPr marL="742950" indent="-285750">
+              <a:defRPr>
+                <a:solidFill>
+                  <a:schemeClr val="tx1"/>
+                </a:solidFill>
+                <a:latin typeface="Calibri" panose="020F0502020204030204" pitchFamily="34" charset="0"/>
+              </a:defRPr>
+            </a:lvl2pPr>
+            <a:lvl3pPr marL="1143000" indent="-228600">
+              <a:defRPr>
+                <a:solidFill>
+                  <a:schemeClr val="tx1"/>
+                </a:solidFill>
+                <a:latin typeface="Calibri" panose="020F0502020204030204" pitchFamily="34" charset="0"/>
+              </a:defRPr>
+            </a:lvl3pPr>
+            <a:lvl4pPr marL="1600200" indent="-228600">
+              <a:defRPr>
+                <a:solidFill>
+                  <a:schemeClr val="tx1"/>
+                </a:solidFill>
+                <a:latin typeface="Calibri" panose="020F0502020204030204" pitchFamily="34" charset="0"/>
+              </a:defRPr>
+            </a:lvl4pPr>
+            <a:lvl5pPr marL="2057400" indent="-228600">
+              <a:defRPr>
+                <a:solidFill>
+                  <a:schemeClr val="tx1"/>
+                </a:solidFill>
+                <a:latin typeface="Calibri" panose="020F0502020204030204" pitchFamily="34" charset="0"/>
+              </a:defRPr>
+            </a:lvl5pPr>
+            <a:lvl6pPr marL="2514600" indent="-228600" eaLnBrk="0" fontAlgn="base" hangingPunct="0">
+              <a:spcBef>
+                <a:spcPct val="0"/>
+              </a:spcBef>
+              <a:spcAft>
+                <a:spcPct val="0"/>
+              </a:spcAft>
+              <a:defRPr>
+                <a:solidFill>
+                  <a:schemeClr val="tx1"/>
+                </a:solidFill>
+                <a:latin typeface="Calibri" panose="020F0502020204030204" pitchFamily="34" charset="0"/>
+              </a:defRPr>
+            </a:lvl6pPr>
+            <a:lvl7pPr marL="2971800" indent="-228600" eaLnBrk="0" fontAlgn="base" hangingPunct="0">
+              <a:spcBef>
+                <a:spcPct val="0"/>
+              </a:spcBef>
+              <a:spcAft>
+                <a:spcPct val="0"/>
+              </a:spcAft>
+              <a:defRPr>
+                <a:solidFill>
+                  <a:schemeClr val="tx1"/>
+                </a:solidFill>
+                <a:latin typeface="Calibri" panose="020F0502020204030204" pitchFamily="34" charset="0"/>
+              </a:defRPr>
+            </a:lvl7pPr>
+            <a:lvl8pPr marL="3429000" indent="-228600" eaLnBrk="0" fontAlgn="base" hangingPunct="0">
+              <a:spcBef>
+                <a:spcPct val="0"/>
+              </a:spcBef>
+              <a:spcAft>
+                <a:spcPct val="0"/>
+              </a:spcAft>
+              <a:defRPr>
+                <a:solidFill>
+                  <a:schemeClr val="tx1"/>
+                </a:solidFill>
+                <a:latin typeface="Calibri" panose="020F0502020204030204" pitchFamily="34" charset="0"/>
+              </a:defRPr>
+            </a:lvl8pPr>
+            <a:lvl9pPr marL="3886200" indent="-228600" eaLnBrk="0" fontAlgn="base" hangingPunct="0">
+              <a:spcBef>
+                <a:spcPct val="0"/>
+              </a:spcBef>
+              <a:spcAft>
+                <a:spcPct val="0"/>
+              </a:spcAft>
+              <a:defRPr>
+                <a:solidFill>
+                  <a:schemeClr val="tx1"/>
+                </a:solidFill>
+                <a:latin typeface="Calibri" panose="020F0502020204030204" pitchFamily="34" charset="0"/>
+              </a:defRPr>
+            </a:lvl9pPr>
+          </a:lstStyle>
+          <a:p>
+            <a:pPr algn="ctr" eaLnBrk="1" hangingPunct="1"/>
+            <a:r>
+              <a:rPr lang="en-US" altLang="en-US" sz="1200" dirty="0" smtClean="0">
+                <a:latin typeface="Arial" panose="020B0604020202020204" pitchFamily="34" charset="0"/>
+                <a:ea typeface="Amazon Ember" panose="020B0603020204020204" pitchFamily="34" charset="0"/>
+                <a:cs typeface="Arial" panose="020B0604020202020204" pitchFamily="34" charset="0"/>
+              </a:rPr>
+              <a:t>Selling </a:t>
+            </a:r>
+            <a:r>
+              <a:rPr lang="en-US" altLang="en-US" sz="1200" dirty="0" smtClean="0">
+                <a:latin typeface="Arial" panose="020B0604020202020204" pitchFamily="34" charset="0"/>
+                <a:ea typeface="Amazon Ember" panose="020B0603020204020204" pitchFamily="34" charset="0"/>
+                <a:cs typeface="Arial" panose="020B0604020202020204" pitchFamily="34" charset="0"/>
+              </a:rPr>
+              <a:t>P</a:t>
+            </a:r>
+            <a:r>
+              <a:rPr lang="en-US" altLang="en-US" sz="1200" dirty="0" smtClean="0">
+                <a:latin typeface="Arial" panose="020B0604020202020204" pitchFamily="34" charset="0"/>
+                <a:ea typeface="Amazon Ember" panose="020B0603020204020204" pitchFamily="34" charset="0"/>
+                <a:cs typeface="Arial" panose="020B0604020202020204" pitchFamily="34" charset="0"/>
+              </a:rPr>
+              <a:t>artner </a:t>
+            </a:r>
+            <a:r>
+              <a:rPr lang="en-US" altLang="en-US" sz="1200" dirty="0" smtClean="0">
+                <a:latin typeface="Arial" panose="020B0604020202020204" pitchFamily="34" charset="0"/>
+                <a:ea typeface="Amazon Ember" panose="020B0603020204020204" pitchFamily="34" charset="0"/>
+                <a:cs typeface="Arial" panose="020B0604020202020204" pitchFamily="34" charset="0"/>
+              </a:rPr>
+              <a:t>API endpoints</a:t>
+            </a:r>
+            <a:endParaRPr lang="en-US" altLang="en-US" sz="1200" dirty="0">
+              <a:latin typeface="Arial" panose="020B0604020202020204" pitchFamily="34" charset="0"/>
+              <a:ea typeface="Amazon Ember" panose="020B0603020204020204" pitchFamily="34" charset="0"/>
+              <a:cs typeface="Arial" panose="020B0604020202020204" pitchFamily="34" charset="0"/>
+            </a:endParaRPr>
+          </a:p>
+        </p:txBody>
+      </p:sp>
+      <p:pic>
+        <p:nvPicPr>
+          <p:cNvPr id="15" name="Graphic 6">
+            <a:extLst>
+              <a:ext uri="{FF2B5EF4-FFF2-40B4-BE49-F238E27FC236}">
+                <a16:creationId xmlns:a16="http://schemas.microsoft.com/office/drawing/2014/main" id="{FD960BCD-0D1F-914A-B9E9-229CD74E312A}"/>
+              </a:ext>
+            </a:extLst>
+          </p:cNvPr>
+          <p:cNvPicPr>
+            <a:picLocks noChangeAspect="1" noChangeArrowheads="1"/>
+          </p:cNvPicPr>
+          <p:nvPr/>
+        </p:nvPicPr>
+        <p:blipFill>
+          <a:blip r:embed="rId8">
+            <a:extLst>
+              <a:ext uri="{96DAC541-7B7A-43D3-8B79-37D633B846F1}">
+                <asvg:svgBlip xmlns:asvg="http://schemas.microsoft.com/office/drawing/2016/SVG/main" xmlns="" r:embed="rId13"/>
+              </a:ext>
+            </a:extLst>
+          </a:blip>
+          <a:srcRect/>
+          <a:stretch/>
+        </p:blipFill>
+        <p:spPr bwMode="auto">
+          <a:xfrm>
+            <a:off x="6859052" y="3735295"/>
+            <a:ext cx="457200" cy="457200"/>
+          </a:xfrm>
+          <a:prstGeom prst="rect">
+            <a:avLst/>
+          </a:prstGeom>
+          <a:noFill/>
+          <a:ln>
+            <a:noFill/>
+          </a:ln>
+          <a:extLst>
+            <a:ext uri="{909E8E84-426E-40DD-AFC4-6F175D3DCCD1}">
+              <a14:hiddenFill xmlns:a14="http://schemas.microsoft.com/office/drawing/2010/main">
+                <a:solidFill>
+                  <a:srgbClr val="FFFFFF"/>
+                </a:solidFill>
+              </a14:hiddenFill>
+            </a:ext>
+            <a:ext uri="{91240B29-F687-4F45-9708-019B960494DF}">
+              <a14:hiddenLine xmlns:a14="http://schemas.microsoft.com/office/drawing/2010/main" w="9525">
+                <a:solidFill>
+                  <a:srgbClr val="000000"/>
+                </a:solidFill>
+                <a:miter lim="800000"/>
+                <a:headEnd/>
+                <a:tailEnd/>
+              </a14:hiddenLine>
+            </a:ext>
+          </a:extLst>
+        </p:spPr>
+      </p:pic>
+      <p:cxnSp>
+        <p:nvCxnSpPr>
+          <p:cNvPr id="27" name="Straight Arrow Connector 26">
+            <a:extLst>
+              <a:ext uri="{FF2B5EF4-FFF2-40B4-BE49-F238E27FC236}">
+                <a16:creationId xmlns:a16="http://schemas.microsoft.com/office/drawing/2014/main" id="{9E8BEF15-E8C4-2242-949A-672EF8C74E91}"/>
+              </a:ext>
+            </a:extLst>
+          </p:cNvPr>
+          <p:cNvCxnSpPr>
+            <a:cxnSpLocks/>
+            <a:stCxn id="12" idx="3"/>
+            <a:endCxn id="15" idx="1"/>
+          </p:cNvCxnSpPr>
+          <p:nvPr/>
+        </p:nvCxnSpPr>
+        <p:spPr>
+          <a:xfrm>
+            <a:off x="5861053" y="3957545"/>
+            <a:ext cx="997999" cy="6350"/>
+          </a:xfrm>
+          <a:prstGeom prst="straightConnector1">
+            <a:avLst/>
+          </a:prstGeom>
+          <a:ln w="12700">
+            <a:solidFill>
+              <a:srgbClr val="545B64"/>
+            </a:solidFill>
+            <a:headEnd type="none" w="med" len="sm"/>
+            <a:tailEnd type="arrow" w="med" len="sm"/>
+          </a:ln>
+        </p:spPr>
+        <p:style>
+          <a:lnRef idx="1">
+            <a:schemeClr val="accent1"/>
+          </a:lnRef>
+          <a:fillRef idx="0">
+            <a:schemeClr val="accent1"/>
+          </a:fillRef>
+          <a:effectRef idx="0">
+            <a:schemeClr val="accent1"/>
+          </a:effectRef>
+          <a:fontRef idx="minor">
+            <a:schemeClr val="tx1"/>
+          </a:fontRef>
+        </p:style>
+      </p:cxnSp>
+      <p:grpSp>
+        <p:nvGrpSpPr>
+          <p:cNvPr id="3" name="Group 2"/>
+          <p:cNvGrpSpPr/>
+          <p:nvPr/>
+        </p:nvGrpSpPr>
+        <p:grpSpPr>
+          <a:xfrm>
+            <a:off x="4333878" y="2450621"/>
+            <a:ext cx="2292350" cy="2170479"/>
+            <a:chOff x="4333878" y="2450621"/>
+            <a:chExt cx="2292350" cy="2170479"/>
+          </a:xfrm>
+        </p:grpSpPr>
+        <p:sp>
+          <p:nvSpPr>
+            <p:cNvPr id="10" name="TextBox 29">
+              <a:extLst>
+                <a:ext uri="{FF2B5EF4-FFF2-40B4-BE49-F238E27FC236}">
+                  <a16:creationId xmlns:a16="http://schemas.microsoft.com/office/drawing/2014/main" id="{A72793CC-CF40-214B-819B-BDB0EF3CE88C}"/>
+                </a:ext>
+              </a:extLst>
+            </p:cNvPr>
+            <p:cNvSpPr txBox="1">
+              <a:spLocks noChangeArrowheads="1"/>
+            </p:cNvSpPr>
+            <p:nvPr/>
+          </p:nvSpPr>
+          <p:spPr bwMode="auto">
+            <a:xfrm>
+              <a:off x="4637091" y="2798611"/>
+              <a:ext cx="1685925" cy="276999"/>
+            </a:xfrm>
+            <a:prstGeom prst="rect">
+              <a:avLst/>
+            </a:prstGeom>
+            <a:noFill/>
+            <a:ln>
+              <a:noFill/>
+            </a:ln>
+            <a:extLst>
+              <a:ext uri="{909E8E84-426E-40DD-AFC4-6F175D3DCCD1}">
+                <a14:hiddenFill xmlns:a14="http://schemas.microsoft.com/office/drawing/2010/main">
+                  <a:solidFill>
+                    <a:srgbClr val="FFFFFF"/>
+                  </a:solidFill>
+                </a14:hiddenFill>
+              </a:ext>
+              <a:ext uri="{91240B29-F687-4F45-9708-019B960494DF}">
+                <a14:hiddenLine xmlns:a14="http://schemas.microsoft.com/office/drawing/2010/main" w="9525">
+                  <a:solidFill>
+                    <a:srgbClr val="000000"/>
+                  </a:solidFill>
+                  <a:miter lim="800000"/>
+                  <a:headEnd/>
+                  <a:tailEnd/>
+                </a14:hiddenLine>
+              </a:ext>
+            </a:extLst>
+          </p:spPr>
+          <p:txBody>
+            <a:bodyPr>
+              <a:spAutoFit/>
+            </a:bodyPr>
+            <a:lstStyle>
+              <a:lvl1pPr>
+                <a:defRPr>
+                  <a:solidFill>
+                    <a:schemeClr val="tx1"/>
+                  </a:solidFill>
+                  <a:latin typeface="Calibri" panose="020F0502020204030204" pitchFamily="34" charset="0"/>
+                </a:defRPr>
+              </a:lvl1pPr>
+              <a:lvl2pPr marL="742950" indent="-285750">
+                <a:defRPr>
+                  <a:solidFill>
+                    <a:schemeClr val="tx1"/>
+                  </a:solidFill>
+                  <a:latin typeface="Calibri" panose="020F0502020204030204" pitchFamily="34" charset="0"/>
+                </a:defRPr>
+              </a:lvl2pPr>
+              <a:lvl3pPr marL="1143000" indent="-228600">
+                <a:defRPr>
+                  <a:solidFill>
+                    <a:schemeClr val="tx1"/>
+                  </a:solidFill>
+                  <a:latin typeface="Calibri" panose="020F0502020204030204" pitchFamily="34" charset="0"/>
+                </a:defRPr>
+              </a:lvl3pPr>
+              <a:lvl4pPr marL="1600200" indent="-228600">
+                <a:defRPr>
+                  <a:solidFill>
+                    <a:schemeClr val="tx1"/>
+                  </a:solidFill>
+                  <a:latin typeface="Calibri" panose="020F0502020204030204" pitchFamily="34" charset="0"/>
+                </a:defRPr>
+              </a:lvl4pPr>
+              <a:lvl5pPr marL="2057400" indent="-228600">
+                <a:defRPr>
+                  <a:solidFill>
+                    <a:schemeClr val="tx1"/>
+                  </a:solidFill>
+                  <a:latin typeface="Calibri" panose="020F0502020204030204" pitchFamily="34" charset="0"/>
+                </a:defRPr>
+              </a:lvl5pPr>
+              <a:lvl6pPr marL="2514600" indent="-228600" eaLnBrk="0" fontAlgn="base" hangingPunct="0">
+                <a:spcBef>
+                  <a:spcPct val="0"/>
+                </a:spcBef>
+                <a:spcAft>
+                  <a:spcPct val="0"/>
+                </a:spcAft>
+                <a:defRPr>
+                  <a:solidFill>
+                    <a:schemeClr val="tx1"/>
+                  </a:solidFill>
+                  <a:latin typeface="Calibri" panose="020F0502020204030204" pitchFamily="34" charset="0"/>
+                </a:defRPr>
+              </a:lvl6pPr>
+              <a:lvl7pPr marL="2971800" indent="-228600" eaLnBrk="0" fontAlgn="base" hangingPunct="0">
+                <a:spcBef>
+                  <a:spcPct val="0"/>
+                </a:spcBef>
+                <a:spcAft>
+                  <a:spcPct val="0"/>
+                </a:spcAft>
+                <a:defRPr>
+                  <a:solidFill>
+                    <a:schemeClr val="tx1"/>
+                  </a:solidFill>
+                  <a:latin typeface="Calibri" panose="020F0502020204030204" pitchFamily="34" charset="0"/>
+                </a:defRPr>
+              </a:lvl7pPr>
+              <a:lvl8pPr marL="3429000" indent="-228600" eaLnBrk="0" fontAlgn="base" hangingPunct="0">
+                <a:spcBef>
+                  <a:spcPct val="0"/>
+                </a:spcBef>
+                <a:spcAft>
+                  <a:spcPct val="0"/>
+                </a:spcAft>
+                <a:defRPr>
+                  <a:solidFill>
+                    <a:schemeClr val="tx1"/>
+                  </a:solidFill>
+                  <a:latin typeface="Calibri" panose="020F0502020204030204" pitchFamily="34" charset="0"/>
+                </a:defRPr>
+              </a:lvl8pPr>
+              <a:lvl9pPr marL="3886200" indent="-228600" eaLnBrk="0" fontAlgn="base" hangingPunct="0">
+                <a:spcBef>
+                  <a:spcPct val="0"/>
+                </a:spcBef>
+                <a:spcAft>
+                  <a:spcPct val="0"/>
+                </a:spcAft>
+                <a:defRPr>
+                  <a:solidFill>
+                    <a:schemeClr val="tx1"/>
+                  </a:solidFill>
+                  <a:latin typeface="Calibri" panose="020F0502020204030204" pitchFamily="34" charset="0"/>
+                </a:defRPr>
+              </a:lvl9pPr>
+            </a:lstStyle>
+            <a:p>
+              <a:pPr algn="ctr" eaLnBrk="1" hangingPunct="1"/>
+              <a:r>
+                <a:rPr lang="en-US" altLang="en-US" sz="1200" dirty="0">
+                  <a:latin typeface="Arial" panose="020B0604020202020204" pitchFamily="34" charset="0"/>
+                  <a:ea typeface="Amazon Ember" panose="020B0603020204020204" pitchFamily="34" charset="0"/>
+                  <a:cs typeface="Arial" panose="020B0604020202020204" pitchFamily="34" charset="0"/>
+                </a:rPr>
+                <a:t>Role</a:t>
+              </a:r>
+            </a:p>
+          </p:txBody>
+        </p:sp>
+        <p:pic>
+          <p:nvPicPr>
+            <p:cNvPr id="11" name="Graphic 49">
+              <a:extLst>
+                <a:ext uri="{FF2B5EF4-FFF2-40B4-BE49-F238E27FC236}">
+                  <a16:creationId xmlns:a16="http://schemas.microsoft.com/office/drawing/2014/main" id="{5A8C48C1-32E1-C747-BB4B-5E3B849CF7A7}"/>
+                </a:ext>
+              </a:extLst>
+            </p:cNvPr>
+            <p:cNvPicPr>
+              <a:picLocks noChangeAspect="1" noChangeArrowheads="1"/>
+            </p:cNvPicPr>
+            <p:nvPr/>
+          </p:nvPicPr>
+          <p:blipFill>
+            <a:blip r:embed="rId14" cstate="print">
+              <a:extLst>
+                <a:ext uri="{28A0092B-C50C-407E-A947-70E740481C1C}">
+                  <a14:useLocalDpi xmlns:a14="http://schemas.microsoft.com/office/drawing/2010/main" val="0"/>
+                </a:ext>
+              </a:extLst>
+            </a:blip>
+            <a:srcRect/>
+            <a:stretch>
+              <a:fillRect/>
+            </a:stretch>
+          </p:blipFill>
+          <p:spPr bwMode="auto">
+            <a:xfrm>
+              <a:off x="5251453" y="2450621"/>
+              <a:ext cx="457200" cy="457200"/>
+            </a:xfrm>
+            <a:prstGeom prst="rect">
+              <a:avLst/>
+            </a:prstGeom>
+            <a:noFill/>
+            <a:ln>
+              <a:noFill/>
+            </a:ln>
+            <a:extLst>
+              <a:ext uri="{909E8E84-426E-40DD-AFC4-6F175D3DCCD1}">
+                <a14:hiddenFill xmlns:a14="http://schemas.microsoft.com/office/drawing/2010/main">
+                  <a:solidFill>
+                    <a:srgbClr val="FFFFFF"/>
+                  </a:solidFill>
+                </a14:hiddenFill>
+              </a:ext>
+              <a:ext uri="{91240B29-F687-4F45-9708-019B960494DF}">
+                <a14:hiddenLine xmlns:a14="http://schemas.microsoft.com/office/drawing/2010/main" w="9525">
+                  <a:solidFill>
+                    <a:srgbClr val="000000"/>
+                  </a:solidFill>
+                  <a:miter lim="800000"/>
+                  <a:headEnd/>
+                  <a:tailEnd/>
+                </a14:hiddenLine>
+              </a:ext>
+            </a:extLst>
+          </p:spPr>
+        </p:pic>
+        <p:pic>
+          <p:nvPicPr>
+            <p:cNvPr id="12" name="Graphic 10">
+              <a:extLst>
+                <a:ext uri="{FF2B5EF4-FFF2-40B4-BE49-F238E27FC236}">
+                  <a16:creationId xmlns:a16="http://schemas.microsoft.com/office/drawing/2014/main" id="{7249C1EC-5A69-3C4D-9DDF-0DB93BB70BC6}"/>
+                </a:ext>
+              </a:extLst>
+            </p:cNvPr>
+            <p:cNvPicPr>
+              <a:picLocks noChangeAspect="1" noChangeArrowheads="1"/>
+            </p:cNvPicPr>
+            <p:nvPr/>
+          </p:nvPicPr>
+          <p:blipFill>
+            <a:blip r:embed="rId15" cstate="print">
+              <a:extLst>
+                <a:ext uri="{28A0092B-C50C-407E-A947-70E740481C1C}">
+                  <a14:useLocalDpi xmlns:a14="http://schemas.microsoft.com/office/drawing/2010/main" val="0"/>
+                </a:ext>
+              </a:extLst>
+            </a:blip>
+            <a:srcRect/>
+            <a:stretch>
+              <a:fillRect/>
+            </a:stretch>
+          </p:blipFill>
+          <p:spPr bwMode="auto">
+            <a:xfrm>
+              <a:off x="5099053" y="3576545"/>
+              <a:ext cx="762000" cy="762000"/>
+            </a:xfrm>
+            <a:prstGeom prst="rect">
+              <a:avLst/>
+            </a:prstGeom>
+            <a:noFill/>
+            <a:ln>
+              <a:noFill/>
+            </a:ln>
+            <a:extLst>
+              <a:ext uri="{909E8E84-426E-40DD-AFC4-6F175D3DCCD1}">
+                <a14:hiddenFill xmlns:a14="http://schemas.microsoft.com/office/drawing/2010/main">
+                  <a:solidFill>
+                    <a:srgbClr val="FFFFFF"/>
+                  </a:solidFill>
+                </a14:hiddenFill>
+              </a:ext>
+              <a:ext uri="{91240B29-F687-4F45-9708-019B960494DF}">
+                <a14:hiddenLine xmlns:a14="http://schemas.microsoft.com/office/drawing/2010/main" w="9525">
+                  <a:solidFill>
+                    <a:srgbClr val="000000"/>
+                  </a:solidFill>
+                  <a:miter lim="800000"/>
+                  <a:headEnd/>
+                  <a:tailEnd/>
+                </a14:hiddenLine>
+              </a:ext>
+            </a:extLst>
+          </p:spPr>
+        </p:pic>
+        <p:sp>
+          <p:nvSpPr>
+            <p:cNvPr id="13" name="TextBox 20">
+              <a:extLst>
+                <a:ext uri="{FF2B5EF4-FFF2-40B4-BE49-F238E27FC236}">
+                  <a16:creationId xmlns:a16="http://schemas.microsoft.com/office/drawing/2014/main" id="{E5D4A7D0-5E44-1943-968A-C198F40D0E71}"/>
+                </a:ext>
+              </a:extLst>
+            </p:cNvPr>
+            <p:cNvSpPr txBox="1">
+              <a:spLocks noChangeArrowheads="1"/>
+            </p:cNvSpPr>
+            <p:nvPr/>
+          </p:nvSpPr>
+          <p:spPr bwMode="auto">
+            <a:xfrm>
+              <a:off x="4333878" y="4344101"/>
+              <a:ext cx="2292350" cy="276999"/>
+            </a:xfrm>
+            <a:prstGeom prst="rect">
+              <a:avLst/>
+            </a:prstGeom>
+            <a:noFill/>
+            <a:ln>
+              <a:noFill/>
+            </a:ln>
+            <a:extLst>
+              <a:ext uri="{909E8E84-426E-40DD-AFC4-6F175D3DCCD1}">
+                <a14:hiddenFill xmlns:a14="http://schemas.microsoft.com/office/drawing/2010/main">
+                  <a:solidFill>
+                    <a:srgbClr val="FFFFFF"/>
+                  </a:solidFill>
+                </a14:hiddenFill>
+              </a:ext>
+              <a:ext uri="{91240B29-F687-4F45-9708-019B960494DF}">
+                <a14:hiddenLine xmlns:a14="http://schemas.microsoft.com/office/drawing/2010/main" w="9525">
+                  <a:solidFill>
+                    <a:srgbClr val="000000"/>
+                  </a:solidFill>
+                  <a:miter lim="800000"/>
+                  <a:headEnd/>
+                  <a:tailEnd/>
+                </a14:hiddenLine>
+              </a:ext>
+            </a:extLst>
+          </p:spPr>
+          <p:txBody>
+            <a:bodyPr>
+              <a:spAutoFit/>
+            </a:bodyPr>
+            <a:lstStyle>
+              <a:lvl1pPr>
+                <a:defRPr>
+                  <a:solidFill>
+                    <a:schemeClr val="tx1"/>
+                  </a:solidFill>
+                  <a:latin typeface="Calibri" panose="020F0502020204030204" pitchFamily="34" charset="0"/>
+                </a:defRPr>
+              </a:lvl1pPr>
+              <a:lvl2pPr marL="742950" indent="-285750">
+                <a:defRPr>
+                  <a:solidFill>
+                    <a:schemeClr val="tx1"/>
+                  </a:solidFill>
+                  <a:latin typeface="Calibri" panose="020F0502020204030204" pitchFamily="34" charset="0"/>
+                </a:defRPr>
+              </a:lvl2pPr>
+              <a:lvl3pPr marL="1143000" indent="-228600">
+                <a:defRPr>
+                  <a:solidFill>
+                    <a:schemeClr val="tx1"/>
+                  </a:solidFill>
+                  <a:latin typeface="Calibri" panose="020F0502020204030204" pitchFamily="34" charset="0"/>
+                </a:defRPr>
+              </a:lvl3pPr>
+              <a:lvl4pPr marL="1600200" indent="-228600">
+                <a:defRPr>
+                  <a:solidFill>
+                    <a:schemeClr val="tx1"/>
+                  </a:solidFill>
+                  <a:latin typeface="Calibri" panose="020F0502020204030204" pitchFamily="34" charset="0"/>
+                </a:defRPr>
+              </a:lvl4pPr>
+              <a:lvl5pPr marL="2057400" indent="-228600">
+                <a:defRPr>
+                  <a:solidFill>
+                    <a:schemeClr val="tx1"/>
+                  </a:solidFill>
+                  <a:latin typeface="Calibri" panose="020F0502020204030204" pitchFamily="34" charset="0"/>
+                </a:defRPr>
+              </a:lvl5pPr>
+              <a:lvl6pPr marL="2514600" indent="-228600" eaLnBrk="0" fontAlgn="base" hangingPunct="0">
+                <a:spcBef>
+                  <a:spcPct val="0"/>
+                </a:spcBef>
+                <a:spcAft>
+                  <a:spcPct val="0"/>
+                </a:spcAft>
+                <a:defRPr>
+                  <a:solidFill>
+                    <a:schemeClr val="tx1"/>
+                  </a:solidFill>
+                  <a:latin typeface="Calibri" panose="020F0502020204030204" pitchFamily="34" charset="0"/>
+                </a:defRPr>
+              </a:lvl6pPr>
+              <a:lvl7pPr marL="2971800" indent="-228600" eaLnBrk="0" fontAlgn="base" hangingPunct="0">
+                <a:spcBef>
+                  <a:spcPct val="0"/>
+                </a:spcBef>
+                <a:spcAft>
+                  <a:spcPct val="0"/>
+                </a:spcAft>
+                <a:defRPr>
+                  <a:solidFill>
+                    <a:schemeClr val="tx1"/>
+                  </a:solidFill>
+                  <a:latin typeface="Calibri" panose="020F0502020204030204" pitchFamily="34" charset="0"/>
+                </a:defRPr>
+              </a:lvl7pPr>
+              <a:lvl8pPr marL="3429000" indent="-228600" eaLnBrk="0" fontAlgn="base" hangingPunct="0">
+                <a:spcBef>
+                  <a:spcPct val="0"/>
+                </a:spcBef>
+                <a:spcAft>
+                  <a:spcPct val="0"/>
+                </a:spcAft>
+                <a:defRPr>
+                  <a:solidFill>
+                    <a:schemeClr val="tx1"/>
+                  </a:solidFill>
+                  <a:latin typeface="Calibri" panose="020F0502020204030204" pitchFamily="34" charset="0"/>
+                </a:defRPr>
+              </a:lvl8pPr>
+              <a:lvl9pPr marL="3886200" indent="-228600" eaLnBrk="0" fontAlgn="base" hangingPunct="0">
+                <a:spcBef>
+                  <a:spcPct val="0"/>
+                </a:spcBef>
+                <a:spcAft>
+                  <a:spcPct val="0"/>
+                </a:spcAft>
+                <a:defRPr>
+                  <a:solidFill>
+                    <a:schemeClr val="tx1"/>
+                  </a:solidFill>
+                  <a:latin typeface="Calibri" panose="020F0502020204030204" pitchFamily="34" charset="0"/>
+                </a:defRPr>
+              </a:lvl9pPr>
+            </a:lstStyle>
+            <a:p>
+              <a:pPr algn="ctr" eaLnBrk="1" hangingPunct="1"/>
+              <a:r>
+                <a:rPr lang="en-US" altLang="en-US" sz="1200" dirty="0">
+                  <a:latin typeface="Arial" panose="020B0604020202020204" pitchFamily="34" charset="0"/>
+                  <a:ea typeface="Amazon Ember" panose="020B0603020204020204" pitchFamily="34" charset="0"/>
+                  <a:cs typeface="Arial" panose="020B0604020202020204" pitchFamily="34" charset="0"/>
+                </a:rPr>
+                <a:t>AWS Lambda</a:t>
+              </a:r>
+            </a:p>
+          </p:txBody>
+        </p:sp>
+        <p:cxnSp>
+          <p:nvCxnSpPr>
+            <p:cNvPr id="22" name="Straight Arrow Connector 21">
+              <a:extLst>
+                <a:ext uri="{FF2B5EF4-FFF2-40B4-BE49-F238E27FC236}">
+                  <a16:creationId xmlns:a16="http://schemas.microsoft.com/office/drawing/2014/main" id="{5A9D33BB-F7AF-C044-9BA5-6F98953C5C41}"/>
+                </a:ext>
+              </a:extLst>
+            </p:cNvPr>
+            <p:cNvCxnSpPr>
+              <a:stCxn id="12" idx="0"/>
+              <a:endCxn id="10" idx="2"/>
+            </p:cNvCxnSpPr>
+            <p:nvPr/>
+          </p:nvCxnSpPr>
+          <p:spPr>
+            <a:xfrm flipV="1">
+              <a:off x="5480053" y="3075610"/>
+              <a:ext cx="1" cy="500935"/>
+            </a:xfrm>
+            <a:prstGeom prst="straightConnector1">
+              <a:avLst/>
+            </a:prstGeom>
+            <a:ln w="12700">
+              <a:solidFill>
+                <a:schemeClr val="tx2"/>
+              </a:solidFill>
+              <a:headEnd type="arrow" w="med" len="sm"/>
+              <a:tailEnd type="none" w="med" len="sm"/>
+            </a:ln>
+          </p:spPr>
+          <p:style>
+            <a:lnRef idx="1">
+              <a:schemeClr val="accent1"/>
+            </a:lnRef>
+            <a:fillRef idx="0">
+              <a:schemeClr val="accent1"/>
+            </a:fillRef>
+            <a:effectRef idx="0">
+              <a:schemeClr val="accent1"/>
+            </a:effectRef>
+            <a:fontRef idx="minor">
+              <a:schemeClr val="tx1"/>
+            </a:fontRef>
+          </p:style>
+        </p:cxnSp>
+      </p:grpSp>
+    </p:spTree>
+    <p:extLst>
+      <p:ext uri="{BB962C8B-B14F-4D97-AF65-F5344CB8AC3E}">
+        <p14:creationId xmlns:p14="http://schemas.microsoft.com/office/powerpoint/2010/main" val="4053817454"/>
       </p:ext>
     </p:extLst>
   </p:cSld>

</xml_diff>

<commit_message>
edits part 1 081321
</commit_message>
<xml_diff>
--- a/docs/images/amazon-selling-partner-api-architecture-diagram.pptx
+++ b/docs/images/amazon-selling-partner-api-architecture-diagram.pptx
@@ -245,7 +245,7 @@
           <a:p>
             <a:fld id="{0285D94C-A752-4E30-A79F-440A4611D5FA}" type="datetimeFigureOut">
               <a:rPr lang="en-US" smtClean="0"/>
-              <a:t>8/9/2021</a:t>
+              <a:t>8/12/2021</a:t>
             </a:fld>
             <a:endParaRPr lang="en-US"/>
           </a:p>
@@ -415,7 +415,7 @@
           <a:p>
             <a:fld id="{0285D94C-A752-4E30-A79F-440A4611D5FA}" type="datetimeFigureOut">
               <a:rPr lang="en-US" smtClean="0"/>
-              <a:t>8/9/2021</a:t>
+              <a:t>8/12/2021</a:t>
             </a:fld>
             <a:endParaRPr lang="en-US"/>
           </a:p>
@@ -595,7 +595,7 @@
           <a:p>
             <a:fld id="{0285D94C-A752-4E30-A79F-440A4611D5FA}" type="datetimeFigureOut">
               <a:rPr lang="en-US" smtClean="0"/>
-              <a:t>8/9/2021</a:t>
+              <a:t>8/12/2021</a:t>
             </a:fld>
             <a:endParaRPr lang="en-US"/>
           </a:p>
@@ -765,7 +765,7 @@
           <a:p>
             <a:fld id="{0285D94C-A752-4E30-A79F-440A4611D5FA}" type="datetimeFigureOut">
               <a:rPr lang="en-US" smtClean="0"/>
-              <a:t>8/9/2021</a:t>
+              <a:t>8/12/2021</a:t>
             </a:fld>
             <a:endParaRPr lang="en-US"/>
           </a:p>
@@ -1011,7 +1011,7 @@
           <a:p>
             <a:fld id="{0285D94C-A752-4E30-A79F-440A4611D5FA}" type="datetimeFigureOut">
               <a:rPr lang="en-US" smtClean="0"/>
-              <a:t>8/9/2021</a:t>
+              <a:t>8/12/2021</a:t>
             </a:fld>
             <a:endParaRPr lang="en-US"/>
           </a:p>
@@ -1243,7 +1243,7 @@
           <a:p>
             <a:fld id="{0285D94C-A752-4E30-A79F-440A4611D5FA}" type="datetimeFigureOut">
               <a:rPr lang="en-US" smtClean="0"/>
-              <a:t>8/9/2021</a:t>
+              <a:t>8/12/2021</a:t>
             </a:fld>
             <a:endParaRPr lang="en-US"/>
           </a:p>
@@ -1610,7 +1610,7 @@
           <a:p>
             <a:fld id="{0285D94C-A752-4E30-A79F-440A4611D5FA}" type="datetimeFigureOut">
               <a:rPr lang="en-US" smtClean="0"/>
-              <a:t>8/9/2021</a:t>
+              <a:t>8/12/2021</a:t>
             </a:fld>
             <a:endParaRPr lang="en-US"/>
           </a:p>
@@ -1728,7 +1728,7 @@
           <a:p>
             <a:fld id="{0285D94C-A752-4E30-A79F-440A4611D5FA}" type="datetimeFigureOut">
               <a:rPr lang="en-US" smtClean="0"/>
-              <a:t>8/9/2021</a:t>
+              <a:t>8/12/2021</a:t>
             </a:fld>
             <a:endParaRPr lang="en-US"/>
           </a:p>
@@ -1823,7 +1823,7 @@
           <a:p>
             <a:fld id="{0285D94C-A752-4E30-A79F-440A4611D5FA}" type="datetimeFigureOut">
               <a:rPr lang="en-US" smtClean="0"/>
-              <a:t>8/9/2021</a:t>
+              <a:t>8/12/2021</a:t>
             </a:fld>
             <a:endParaRPr lang="en-US"/>
           </a:p>
@@ -2100,7 +2100,7 @@
           <a:p>
             <a:fld id="{0285D94C-A752-4E30-A79F-440A4611D5FA}" type="datetimeFigureOut">
               <a:rPr lang="en-US" smtClean="0"/>
-              <a:t>8/9/2021</a:t>
+              <a:t>8/12/2021</a:t>
             </a:fld>
             <a:endParaRPr lang="en-US"/>
           </a:p>
@@ -2353,7 +2353,7 @@
           <a:p>
             <a:fld id="{0285D94C-A752-4E30-A79F-440A4611D5FA}" type="datetimeFigureOut">
               <a:rPr lang="en-US" smtClean="0"/>
-              <a:t>8/9/2021</a:t>
+              <a:t>8/12/2021</a:t>
             </a:fld>
             <a:endParaRPr lang="en-US"/>
           </a:p>
@@ -2566,7 +2566,7 @@
           <a:p>
             <a:fld id="{0285D94C-A752-4E30-A79F-440A4611D5FA}" type="datetimeFigureOut">
               <a:rPr lang="en-US" smtClean="0"/>
-              <a:t>8/9/2021</a:t>
+              <a:t>8/12/2021</a:t>
             </a:fld>
             <a:endParaRPr lang="en-US"/>
           </a:p>
@@ -3058,7 +3058,7 @@
           <a:blip r:embed="rId2">
             <a:extLst>
               <a:ext uri="{96DAC541-7B7A-43D3-8B79-37D633B846F1}">
-                <asvg:svgBlip xmlns:asvg="http://schemas.microsoft.com/office/drawing/2016/SVG/main" xmlns="" r:embed="rId7"/>
+                <asvg:svgBlip xmlns="" xmlns:asvg="http://schemas.microsoft.com/office/drawing/2016/SVG/main" r:embed="rId7"/>
               </a:ext>
             </a:extLst>
           </a:blip>
@@ -4143,7 +4143,7 @@
           <a:blip r:embed="rId12">
             <a:extLst>
               <a:ext uri="{96DAC541-7B7A-43D3-8B79-37D633B846F1}">
-                <asvg:svgBlip xmlns:asvg="http://schemas.microsoft.com/office/drawing/2016/SVG/main" xmlns="" r:embed="rId13"/>
+                <asvg:svgBlip xmlns="" xmlns:asvg="http://schemas.microsoft.com/office/drawing/2016/SVG/main" r:embed="rId13"/>
               </a:ext>
             </a:extLst>
           </a:blip>
@@ -4201,7 +4201,7 @@
           <a:blip r:embed="rId14">
             <a:extLst>
               <a:ext uri="{96DAC541-7B7A-43D3-8B79-37D633B846F1}">
-                <asvg:svgBlip xmlns:asvg="http://schemas.microsoft.com/office/drawing/2016/SVG/main" xmlns="" r:embed="rId22"/>
+                <asvg:svgBlip xmlns="" xmlns:asvg="http://schemas.microsoft.com/office/drawing/2016/SVG/main" r:embed="rId22"/>
               </a:ext>
             </a:extLst>
           </a:blip>
@@ -4820,7 +4820,7 @@
           <a:blip r:embed="rId2">
             <a:extLst>
               <a:ext uri="{96DAC541-7B7A-43D3-8B79-37D633B846F1}">
-                <asvg:svgBlip xmlns:asvg="http://schemas.microsoft.com/office/drawing/2016/SVG/main" xmlns="" r:embed="rId7"/>
+                <asvg:svgBlip xmlns="" xmlns:asvg="http://schemas.microsoft.com/office/drawing/2016/SVG/main" r:embed="rId7"/>
               </a:ext>
             </a:extLst>
           </a:blip>
@@ -5684,7 +5684,7 @@
           <a:blip r:embed="rId11">
             <a:extLst>
               <a:ext uri="{96DAC541-7B7A-43D3-8B79-37D633B846F1}">
-                <asvg:svgBlip xmlns:asvg="http://schemas.microsoft.com/office/drawing/2016/SVG/main" xmlns="" r:embed="rId13"/>
+                <asvg:svgBlip xmlns="" xmlns:asvg="http://schemas.microsoft.com/office/drawing/2016/SVG/main" r:embed="rId13"/>
               </a:ext>
             </a:extLst>
           </a:blip>
@@ -5742,7 +5742,7 @@
           <a:blip r:embed="rId14">
             <a:extLst>
               <a:ext uri="{96DAC541-7B7A-43D3-8B79-37D633B846F1}">
-                <asvg:svgBlip xmlns:asvg="http://schemas.microsoft.com/office/drawing/2016/SVG/main" xmlns="" r:embed="rId22"/>
+                <asvg:svgBlip xmlns="" xmlns:asvg="http://schemas.microsoft.com/office/drawing/2016/SVG/main" r:embed="rId22"/>
               </a:ext>
             </a:extLst>
           </a:blip>
@@ -6360,7 +6360,7 @@
           <a:blip r:embed="rId2">
             <a:extLst>
               <a:ext uri="{96DAC541-7B7A-43D3-8B79-37D633B846F1}">
-                <asvg:svgBlip xmlns:asvg="http://schemas.microsoft.com/office/drawing/2016/SVG/main" xmlns="" r:embed="rId7"/>
+                <asvg:svgBlip xmlns="" xmlns:asvg="http://schemas.microsoft.com/office/drawing/2016/SVG/main" r:embed="rId7"/>
               </a:ext>
             </a:extLst>
           </a:blip>
@@ -6533,31 +6533,7 @@
                 <a:ea typeface="Amazon Ember" panose="020B0603020204020204" pitchFamily="34" charset="0"/>
                 <a:cs typeface="Arial" panose="020B0604020202020204" pitchFamily="34" charset="0"/>
               </a:rPr>
-              <a:t>Selling </a:t>
-            </a:r>
-            <a:r>
-              <a:rPr lang="en-US" altLang="en-US" sz="1200" dirty="0" smtClean="0">
-                <a:latin typeface="Arial" panose="020B0604020202020204" pitchFamily="34" charset="0"/>
-                <a:ea typeface="Amazon Ember" panose="020B0603020204020204" pitchFamily="34" charset="0"/>
-                <a:cs typeface="Arial" panose="020B0604020202020204" pitchFamily="34" charset="0"/>
-              </a:rPr>
-              <a:t>P</a:t>
-            </a:r>
-            <a:r>
-              <a:rPr lang="en-US" altLang="en-US" sz="1200" dirty="0" smtClean="0">
-                <a:latin typeface="Arial" panose="020B0604020202020204" pitchFamily="34" charset="0"/>
-                <a:ea typeface="Amazon Ember" panose="020B0603020204020204" pitchFamily="34" charset="0"/>
-                <a:cs typeface="Arial" panose="020B0604020202020204" pitchFamily="34" charset="0"/>
-              </a:rPr>
-              <a:t>artner </a:t>
-            </a:r>
-            <a:r>
-              <a:rPr lang="en-US" altLang="en-US" sz="1200" dirty="0" smtClean="0">
-                <a:latin typeface="Arial" panose="020B0604020202020204" pitchFamily="34" charset="0"/>
-                <a:ea typeface="Amazon Ember" panose="020B0603020204020204" pitchFamily="34" charset="0"/>
-                <a:cs typeface="Arial" panose="020B0604020202020204" pitchFamily="34" charset="0"/>
-              </a:rPr>
-              <a:t>API endpoints</a:t>
+              <a:t>Selling Partner API endpoints</a:t>
             </a:r>
             <a:endParaRPr lang="en-US" altLang="en-US" sz="1200" dirty="0">
               <a:latin typeface="Arial" panose="020B0604020202020204" pitchFamily="34" charset="0"/>
@@ -6585,7 +6561,7 @@
           <a:blip r:embed="rId8">
             <a:extLst>
               <a:ext uri="{96DAC541-7B7A-43D3-8B79-37D633B846F1}">
-                <asvg:svgBlip xmlns:asvg="http://schemas.microsoft.com/office/drawing/2016/SVG/main" xmlns="" r:embed="rId13"/>
+                <asvg:svgBlip xmlns="" xmlns:asvg="http://schemas.microsoft.com/office/drawing/2016/SVG/main" r:embed="rId13"/>
               </a:ext>
             </a:extLst>
           </a:blip>
@@ -6672,509 +6648,762 @@
           </a:fontRef>
         </p:style>
       </p:cxnSp>
-      <p:grpSp>
-        <p:nvGrpSpPr>
-          <p:cNvPr id="3" name="Group 2"/>
-          <p:cNvGrpSpPr/>
-          <p:nvPr/>
-        </p:nvGrpSpPr>
-        <p:grpSpPr>
-          <a:xfrm>
-            <a:off x="4333878" y="2450621"/>
-            <a:ext cx="2292350" cy="2170479"/>
-            <a:chOff x="4333878" y="2450621"/>
-            <a:chExt cx="2292350" cy="2170479"/>
-          </a:xfrm>
-        </p:grpSpPr>
-        <p:sp>
-          <p:nvSpPr>
-            <p:cNvPr id="10" name="TextBox 29">
-              <a:extLst>
-                <a:ext uri="{FF2B5EF4-FFF2-40B4-BE49-F238E27FC236}">
-                  <a16:creationId xmlns:a16="http://schemas.microsoft.com/office/drawing/2014/main" id="{A72793CC-CF40-214B-819B-BDB0EF3CE88C}"/>
-                </a:ext>
-              </a:extLst>
-            </p:cNvPr>
-            <p:cNvSpPr txBox="1">
-              <a:spLocks noChangeArrowheads="1"/>
-            </p:cNvSpPr>
-            <p:nvPr/>
-          </p:nvSpPr>
-          <p:spPr bwMode="auto">
-            <a:xfrm>
-              <a:off x="4637091" y="2798611"/>
-              <a:ext cx="1685925" cy="276999"/>
-            </a:xfrm>
-            <a:prstGeom prst="rect">
-              <a:avLst/>
-            </a:prstGeom>
-            <a:noFill/>
-            <a:ln>
-              <a:noFill/>
-            </a:ln>
+      <p:sp>
+        <p:nvSpPr>
+          <p:cNvPr id="10" name="TextBox 29">
             <a:extLst>
-              <a:ext uri="{909E8E84-426E-40DD-AFC4-6F175D3DCCD1}">
-                <a14:hiddenFill xmlns:a14="http://schemas.microsoft.com/office/drawing/2010/main">
-                  <a:solidFill>
-                    <a:srgbClr val="FFFFFF"/>
-                  </a:solidFill>
-                </a14:hiddenFill>
-              </a:ext>
-              <a:ext uri="{91240B29-F687-4F45-9708-019B960494DF}">
-                <a14:hiddenLine xmlns:a14="http://schemas.microsoft.com/office/drawing/2010/main" w="9525">
-                  <a:solidFill>
-                    <a:srgbClr val="000000"/>
-                  </a:solidFill>
-                  <a:miter lim="800000"/>
-                  <a:headEnd/>
-                  <a:tailEnd/>
-                </a14:hiddenLine>
+              <a:ext uri="{FF2B5EF4-FFF2-40B4-BE49-F238E27FC236}">
+                <a16:creationId xmlns:a16="http://schemas.microsoft.com/office/drawing/2014/main" id="{A72793CC-CF40-214B-819B-BDB0EF3CE88C}"/>
               </a:ext>
             </a:extLst>
-          </p:spPr>
-          <p:txBody>
-            <a:bodyPr>
-              <a:spAutoFit/>
-            </a:bodyPr>
-            <a:lstStyle>
-              <a:lvl1pPr>
-                <a:defRPr>
-                  <a:solidFill>
-                    <a:schemeClr val="tx1"/>
-                  </a:solidFill>
-                  <a:latin typeface="Calibri" panose="020F0502020204030204" pitchFamily="34" charset="0"/>
-                </a:defRPr>
-              </a:lvl1pPr>
-              <a:lvl2pPr marL="742950" indent="-285750">
-                <a:defRPr>
-                  <a:solidFill>
-                    <a:schemeClr val="tx1"/>
-                  </a:solidFill>
-                  <a:latin typeface="Calibri" panose="020F0502020204030204" pitchFamily="34" charset="0"/>
-                </a:defRPr>
-              </a:lvl2pPr>
-              <a:lvl3pPr marL="1143000" indent="-228600">
-                <a:defRPr>
-                  <a:solidFill>
-                    <a:schemeClr val="tx1"/>
-                  </a:solidFill>
-                  <a:latin typeface="Calibri" panose="020F0502020204030204" pitchFamily="34" charset="0"/>
-                </a:defRPr>
-              </a:lvl3pPr>
-              <a:lvl4pPr marL="1600200" indent="-228600">
-                <a:defRPr>
-                  <a:solidFill>
-                    <a:schemeClr val="tx1"/>
-                  </a:solidFill>
-                  <a:latin typeface="Calibri" panose="020F0502020204030204" pitchFamily="34" charset="0"/>
-                </a:defRPr>
-              </a:lvl4pPr>
-              <a:lvl5pPr marL="2057400" indent="-228600">
-                <a:defRPr>
-                  <a:solidFill>
-                    <a:schemeClr val="tx1"/>
-                  </a:solidFill>
-                  <a:latin typeface="Calibri" panose="020F0502020204030204" pitchFamily="34" charset="0"/>
-                </a:defRPr>
-              </a:lvl5pPr>
-              <a:lvl6pPr marL="2514600" indent="-228600" eaLnBrk="0" fontAlgn="base" hangingPunct="0">
-                <a:spcBef>
-                  <a:spcPct val="0"/>
-                </a:spcBef>
-                <a:spcAft>
-                  <a:spcPct val="0"/>
-                </a:spcAft>
-                <a:defRPr>
-                  <a:solidFill>
-                    <a:schemeClr val="tx1"/>
-                  </a:solidFill>
-                  <a:latin typeface="Calibri" panose="020F0502020204030204" pitchFamily="34" charset="0"/>
-                </a:defRPr>
-              </a:lvl6pPr>
-              <a:lvl7pPr marL="2971800" indent="-228600" eaLnBrk="0" fontAlgn="base" hangingPunct="0">
-                <a:spcBef>
-                  <a:spcPct val="0"/>
-                </a:spcBef>
-                <a:spcAft>
-                  <a:spcPct val="0"/>
-                </a:spcAft>
-                <a:defRPr>
-                  <a:solidFill>
-                    <a:schemeClr val="tx1"/>
-                  </a:solidFill>
-                  <a:latin typeface="Calibri" panose="020F0502020204030204" pitchFamily="34" charset="0"/>
-                </a:defRPr>
-              </a:lvl7pPr>
-              <a:lvl8pPr marL="3429000" indent="-228600" eaLnBrk="0" fontAlgn="base" hangingPunct="0">
-                <a:spcBef>
-                  <a:spcPct val="0"/>
-                </a:spcBef>
-                <a:spcAft>
-                  <a:spcPct val="0"/>
-                </a:spcAft>
-                <a:defRPr>
-                  <a:solidFill>
-                    <a:schemeClr val="tx1"/>
-                  </a:solidFill>
-                  <a:latin typeface="Calibri" panose="020F0502020204030204" pitchFamily="34" charset="0"/>
-                </a:defRPr>
-              </a:lvl8pPr>
-              <a:lvl9pPr marL="3886200" indent="-228600" eaLnBrk="0" fontAlgn="base" hangingPunct="0">
-                <a:spcBef>
-                  <a:spcPct val="0"/>
-                </a:spcBef>
-                <a:spcAft>
-                  <a:spcPct val="0"/>
-                </a:spcAft>
-                <a:defRPr>
-                  <a:solidFill>
-                    <a:schemeClr val="tx1"/>
-                  </a:solidFill>
-                  <a:latin typeface="Calibri" panose="020F0502020204030204" pitchFamily="34" charset="0"/>
-                </a:defRPr>
-              </a:lvl9pPr>
-            </a:lstStyle>
-            <a:p>
-              <a:pPr algn="ctr" eaLnBrk="1" hangingPunct="1"/>
-              <a:r>
-                <a:rPr lang="en-US" altLang="en-US" sz="1200" dirty="0">
-                  <a:latin typeface="Arial" panose="020B0604020202020204" pitchFamily="34" charset="0"/>
-                  <a:ea typeface="Amazon Ember" panose="020B0603020204020204" pitchFamily="34" charset="0"/>
-                  <a:cs typeface="Arial" panose="020B0604020202020204" pitchFamily="34" charset="0"/>
-                </a:rPr>
-                <a:t>Role</a:t>
-              </a:r>
-            </a:p>
-          </p:txBody>
-        </p:sp>
-        <p:pic>
-          <p:nvPicPr>
-            <p:cNvPr id="11" name="Graphic 49">
-              <a:extLst>
-                <a:ext uri="{FF2B5EF4-FFF2-40B4-BE49-F238E27FC236}">
-                  <a16:creationId xmlns:a16="http://schemas.microsoft.com/office/drawing/2014/main" id="{5A8C48C1-32E1-C747-BB4B-5E3B849CF7A7}"/>
-                </a:ext>
-              </a:extLst>
-            </p:cNvPr>
-            <p:cNvPicPr>
-              <a:picLocks noChangeAspect="1" noChangeArrowheads="1"/>
-            </p:cNvPicPr>
-            <p:nvPr/>
-          </p:nvPicPr>
-          <p:blipFill>
-            <a:blip r:embed="rId14" cstate="print">
-              <a:extLst>
-                <a:ext uri="{28A0092B-C50C-407E-A947-70E740481C1C}">
-                  <a14:useLocalDpi xmlns:a14="http://schemas.microsoft.com/office/drawing/2010/main" val="0"/>
-                </a:ext>
-              </a:extLst>
-            </a:blip>
-            <a:srcRect/>
-            <a:stretch>
-              <a:fillRect/>
-            </a:stretch>
-          </p:blipFill>
-          <p:spPr bwMode="auto">
-            <a:xfrm>
-              <a:off x="5251453" y="2450621"/>
-              <a:ext cx="457200" cy="457200"/>
-            </a:xfrm>
-            <a:prstGeom prst="rect">
-              <a:avLst/>
-            </a:prstGeom>
+          </p:cNvPr>
+          <p:cNvSpPr txBox="1">
+            <a:spLocks noChangeArrowheads="1"/>
+          </p:cNvSpPr>
+          <p:nvPr/>
+        </p:nvSpPr>
+        <p:spPr bwMode="auto">
+          <a:xfrm>
+            <a:off x="4637091" y="2798611"/>
+            <a:ext cx="1685925" cy="276999"/>
+          </a:xfrm>
+          <a:prstGeom prst="rect">
+            <a:avLst/>
+          </a:prstGeom>
+          <a:noFill/>
+          <a:ln>
             <a:noFill/>
-            <a:ln>
-              <a:noFill/>
-            </a:ln>
+          </a:ln>
+          <a:extLst>
+            <a:ext uri="{909E8E84-426E-40DD-AFC4-6F175D3DCCD1}">
+              <a14:hiddenFill xmlns:a14="http://schemas.microsoft.com/office/drawing/2010/main">
+                <a:solidFill>
+                  <a:srgbClr val="FFFFFF"/>
+                </a:solidFill>
+              </a14:hiddenFill>
+            </a:ext>
+            <a:ext uri="{91240B29-F687-4F45-9708-019B960494DF}">
+              <a14:hiddenLine xmlns:a14="http://schemas.microsoft.com/office/drawing/2010/main" w="9525">
+                <a:solidFill>
+                  <a:srgbClr val="000000"/>
+                </a:solidFill>
+                <a:miter lim="800000"/>
+                <a:headEnd/>
+                <a:tailEnd/>
+              </a14:hiddenLine>
+            </a:ext>
+          </a:extLst>
+        </p:spPr>
+        <p:txBody>
+          <a:bodyPr>
+            <a:spAutoFit/>
+          </a:bodyPr>
+          <a:lstStyle>
+            <a:lvl1pPr>
+              <a:defRPr>
+                <a:solidFill>
+                  <a:schemeClr val="tx1"/>
+                </a:solidFill>
+                <a:latin typeface="Calibri" panose="020F0502020204030204" pitchFamily="34" charset="0"/>
+              </a:defRPr>
+            </a:lvl1pPr>
+            <a:lvl2pPr marL="742950" indent="-285750">
+              <a:defRPr>
+                <a:solidFill>
+                  <a:schemeClr val="tx1"/>
+                </a:solidFill>
+                <a:latin typeface="Calibri" panose="020F0502020204030204" pitchFamily="34" charset="0"/>
+              </a:defRPr>
+            </a:lvl2pPr>
+            <a:lvl3pPr marL="1143000" indent="-228600">
+              <a:defRPr>
+                <a:solidFill>
+                  <a:schemeClr val="tx1"/>
+                </a:solidFill>
+                <a:latin typeface="Calibri" panose="020F0502020204030204" pitchFamily="34" charset="0"/>
+              </a:defRPr>
+            </a:lvl3pPr>
+            <a:lvl4pPr marL="1600200" indent="-228600">
+              <a:defRPr>
+                <a:solidFill>
+                  <a:schemeClr val="tx1"/>
+                </a:solidFill>
+                <a:latin typeface="Calibri" panose="020F0502020204030204" pitchFamily="34" charset="0"/>
+              </a:defRPr>
+            </a:lvl4pPr>
+            <a:lvl5pPr marL="2057400" indent="-228600">
+              <a:defRPr>
+                <a:solidFill>
+                  <a:schemeClr val="tx1"/>
+                </a:solidFill>
+                <a:latin typeface="Calibri" panose="020F0502020204030204" pitchFamily="34" charset="0"/>
+              </a:defRPr>
+            </a:lvl5pPr>
+            <a:lvl6pPr marL="2514600" indent="-228600" eaLnBrk="0" fontAlgn="base" hangingPunct="0">
+              <a:spcBef>
+                <a:spcPct val="0"/>
+              </a:spcBef>
+              <a:spcAft>
+                <a:spcPct val="0"/>
+              </a:spcAft>
+              <a:defRPr>
+                <a:solidFill>
+                  <a:schemeClr val="tx1"/>
+                </a:solidFill>
+                <a:latin typeface="Calibri" panose="020F0502020204030204" pitchFamily="34" charset="0"/>
+              </a:defRPr>
+            </a:lvl6pPr>
+            <a:lvl7pPr marL="2971800" indent="-228600" eaLnBrk="0" fontAlgn="base" hangingPunct="0">
+              <a:spcBef>
+                <a:spcPct val="0"/>
+              </a:spcBef>
+              <a:spcAft>
+                <a:spcPct val="0"/>
+              </a:spcAft>
+              <a:defRPr>
+                <a:solidFill>
+                  <a:schemeClr val="tx1"/>
+                </a:solidFill>
+                <a:latin typeface="Calibri" panose="020F0502020204030204" pitchFamily="34" charset="0"/>
+              </a:defRPr>
+            </a:lvl7pPr>
+            <a:lvl8pPr marL="3429000" indent="-228600" eaLnBrk="0" fontAlgn="base" hangingPunct="0">
+              <a:spcBef>
+                <a:spcPct val="0"/>
+              </a:spcBef>
+              <a:spcAft>
+                <a:spcPct val="0"/>
+              </a:spcAft>
+              <a:defRPr>
+                <a:solidFill>
+                  <a:schemeClr val="tx1"/>
+                </a:solidFill>
+                <a:latin typeface="Calibri" panose="020F0502020204030204" pitchFamily="34" charset="0"/>
+              </a:defRPr>
+            </a:lvl8pPr>
+            <a:lvl9pPr marL="3886200" indent="-228600" eaLnBrk="0" fontAlgn="base" hangingPunct="0">
+              <a:spcBef>
+                <a:spcPct val="0"/>
+              </a:spcBef>
+              <a:spcAft>
+                <a:spcPct val="0"/>
+              </a:spcAft>
+              <a:defRPr>
+                <a:solidFill>
+                  <a:schemeClr val="tx1"/>
+                </a:solidFill>
+                <a:latin typeface="Calibri" panose="020F0502020204030204" pitchFamily="34" charset="0"/>
+              </a:defRPr>
+            </a:lvl9pPr>
+          </a:lstStyle>
+          <a:p>
+            <a:pPr algn="ctr" eaLnBrk="1" hangingPunct="1"/>
+            <a:r>
+              <a:rPr lang="en-US" altLang="en-US" sz="1200" dirty="0">
+                <a:latin typeface="Arial" panose="020B0604020202020204" pitchFamily="34" charset="0"/>
+                <a:ea typeface="Amazon Ember" panose="020B0603020204020204" pitchFamily="34" charset="0"/>
+                <a:cs typeface="Arial" panose="020B0604020202020204" pitchFamily="34" charset="0"/>
+              </a:rPr>
+              <a:t>Role</a:t>
+            </a:r>
+          </a:p>
+        </p:txBody>
+      </p:sp>
+      <p:pic>
+        <p:nvPicPr>
+          <p:cNvPr id="11" name="Graphic 49">
             <a:extLst>
-              <a:ext uri="{909E8E84-426E-40DD-AFC4-6F175D3DCCD1}">
-                <a14:hiddenFill xmlns:a14="http://schemas.microsoft.com/office/drawing/2010/main">
-                  <a:solidFill>
-                    <a:srgbClr val="FFFFFF"/>
-                  </a:solidFill>
-                </a14:hiddenFill>
-              </a:ext>
-              <a:ext uri="{91240B29-F687-4F45-9708-019B960494DF}">
-                <a14:hiddenLine xmlns:a14="http://schemas.microsoft.com/office/drawing/2010/main" w="9525">
-                  <a:solidFill>
-                    <a:srgbClr val="000000"/>
-                  </a:solidFill>
-                  <a:miter lim="800000"/>
-                  <a:headEnd/>
-                  <a:tailEnd/>
-                </a14:hiddenLine>
+              <a:ext uri="{FF2B5EF4-FFF2-40B4-BE49-F238E27FC236}">
+                <a16:creationId xmlns:a16="http://schemas.microsoft.com/office/drawing/2014/main" id="{5A8C48C1-32E1-C747-BB4B-5E3B849CF7A7}"/>
               </a:ext>
             </a:extLst>
-          </p:spPr>
-        </p:pic>
-        <p:pic>
-          <p:nvPicPr>
-            <p:cNvPr id="12" name="Graphic 10">
-              <a:extLst>
-                <a:ext uri="{FF2B5EF4-FFF2-40B4-BE49-F238E27FC236}">
-                  <a16:creationId xmlns:a16="http://schemas.microsoft.com/office/drawing/2014/main" id="{7249C1EC-5A69-3C4D-9DDF-0DB93BB70BC6}"/>
-                </a:ext>
-              </a:extLst>
-            </p:cNvPr>
-            <p:cNvPicPr>
-              <a:picLocks noChangeAspect="1" noChangeArrowheads="1"/>
-            </p:cNvPicPr>
-            <p:nvPr/>
-          </p:nvPicPr>
-          <p:blipFill>
-            <a:blip r:embed="rId15" cstate="print">
-              <a:extLst>
-                <a:ext uri="{28A0092B-C50C-407E-A947-70E740481C1C}">
-                  <a14:useLocalDpi xmlns:a14="http://schemas.microsoft.com/office/drawing/2010/main" val="0"/>
-                </a:ext>
-              </a:extLst>
-            </a:blip>
-            <a:srcRect/>
-            <a:stretch>
-              <a:fillRect/>
-            </a:stretch>
-          </p:blipFill>
-          <p:spPr bwMode="auto">
-            <a:xfrm>
-              <a:off x="5099053" y="3576545"/>
-              <a:ext cx="762000" cy="762000"/>
-            </a:xfrm>
-            <a:prstGeom prst="rect">
-              <a:avLst/>
-            </a:prstGeom>
-            <a:noFill/>
-            <a:ln>
-              <a:noFill/>
-            </a:ln>
+          </p:cNvPr>
+          <p:cNvPicPr>
+            <a:picLocks noChangeAspect="1" noChangeArrowheads="1"/>
+          </p:cNvPicPr>
+          <p:nvPr/>
+        </p:nvPicPr>
+        <p:blipFill>
+          <a:blip r:embed="rId14" cstate="print">
             <a:extLst>
-              <a:ext uri="{909E8E84-426E-40DD-AFC4-6F175D3DCCD1}">
-                <a14:hiddenFill xmlns:a14="http://schemas.microsoft.com/office/drawing/2010/main">
-                  <a:solidFill>
-                    <a:srgbClr val="FFFFFF"/>
-                  </a:solidFill>
-                </a14:hiddenFill>
-              </a:ext>
-              <a:ext uri="{91240B29-F687-4F45-9708-019B960494DF}">
-                <a14:hiddenLine xmlns:a14="http://schemas.microsoft.com/office/drawing/2010/main" w="9525">
-                  <a:solidFill>
-                    <a:srgbClr val="000000"/>
-                  </a:solidFill>
-                  <a:miter lim="800000"/>
-                  <a:headEnd/>
-                  <a:tailEnd/>
-                </a14:hiddenLine>
+              <a:ext uri="{28A0092B-C50C-407E-A947-70E740481C1C}">
+                <a14:useLocalDpi xmlns:a14="http://schemas.microsoft.com/office/drawing/2010/main" val="0"/>
               </a:ext>
             </a:extLst>
-          </p:spPr>
-        </p:pic>
-        <p:sp>
-          <p:nvSpPr>
-            <p:cNvPr id="13" name="TextBox 20">
-              <a:extLst>
-                <a:ext uri="{FF2B5EF4-FFF2-40B4-BE49-F238E27FC236}">
-                  <a16:creationId xmlns:a16="http://schemas.microsoft.com/office/drawing/2014/main" id="{E5D4A7D0-5E44-1943-968A-C198F40D0E71}"/>
-                </a:ext>
-              </a:extLst>
-            </p:cNvPr>
-            <p:cNvSpPr txBox="1">
-              <a:spLocks noChangeArrowheads="1"/>
-            </p:cNvSpPr>
-            <p:nvPr/>
-          </p:nvSpPr>
-          <p:spPr bwMode="auto">
-            <a:xfrm>
-              <a:off x="4333878" y="4344101"/>
-              <a:ext cx="2292350" cy="276999"/>
-            </a:xfrm>
-            <a:prstGeom prst="rect">
-              <a:avLst/>
-            </a:prstGeom>
+          </a:blip>
+          <a:srcRect/>
+          <a:stretch>
+            <a:fillRect/>
+          </a:stretch>
+        </p:blipFill>
+        <p:spPr bwMode="auto">
+          <a:xfrm>
+            <a:off x="5251453" y="2450621"/>
+            <a:ext cx="457200" cy="457200"/>
+          </a:xfrm>
+          <a:prstGeom prst="rect">
+            <a:avLst/>
+          </a:prstGeom>
+          <a:noFill/>
+          <a:ln>
             <a:noFill/>
-            <a:ln>
-              <a:noFill/>
-            </a:ln>
+          </a:ln>
+          <a:extLst>
+            <a:ext uri="{909E8E84-426E-40DD-AFC4-6F175D3DCCD1}">
+              <a14:hiddenFill xmlns:a14="http://schemas.microsoft.com/office/drawing/2010/main">
+                <a:solidFill>
+                  <a:srgbClr val="FFFFFF"/>
+                </a:solidFill>
+              </a14:hiddenFill>
+            </a:ext>
+            <a:ext uri="{91240B29-F687-4F45-9708-019B960494DF}">
+              <a14:hiddenLine xmlns:a14="http://schemas.microsoft.com/office/drawing/2010/main" w="9525">
+                <a:solidFill>
+                  <a:srgbClr val="000000"/>
+                </a:solidFill>
+                <a:miter lim="800000"/>
+                <a:headEnd/>
+                <a:tailEnd/>
+              </a14:hiddenLine>
+            </a:ext>
+          </a:extLst>
+        </p:spPr>
+      </p:pic>
+      <p:pic>
+        <p:nvPicPr>
+          <p:cNvPr id="12" name="Graphic 10">
             <a:extLst>
-              <a:ext uri="{909E8E84-426E-40DD-AFC4-6F175D3DCCD1}">
-                <a14:hiddenFill xmlns:a14="http://schemas.microsoft.com/office/drawing/2010/main">
-                  <a:solidFill>
-                    <a:srgbClr val="FFFFFF"/>
-                  </a:solidFill>
-                </a14:hiddenFill>
-              </a:ext>
-              <a:ext uri="{91240B29-F687-4F45-9708-019B960494DF}">
-                <a14:hiddenLine xmlns:a14="http://schemas.microsoft.com/office/drawing/2010/main" w="9525">
-                  <a:solidFill>
-                    <a:srgbClr val="000000"/>
-                  </a:solidFill>
-                  <a:miter lim="800000"/>
-                  <a:headEnd/>
-                  <a:tailEnd/>
-                </a14:hiddenLine>
+              <a:ext uri="{FF2B5EF4-FFF2-40B4-BE49-F238E27FC236}">
+                <a16:creationId xmlns:a16="http://schemas.microsoft.com/office/drawing/2014/main" id="{7249C1EC-5A69-3C4D-9DDF-0DB93BB70BC6}"/>
               </a:ext>
             </a:extLst>
-          </p:spPr>
-          <p:txBody>
-            <a:bodyPr>
-              <a:spAutoFit/>
-            </a:bodyPr>
-            <a:lstStyle>
-              <a:lvl1pPr>
-                <a:defRPr>
-                  <a:solidFill>
-                    <a:schemeClr val="tx1"/>
-                  </a:solidFill>
-                  <a:latin typeface="Calibri" panose="020F0502020204030204" pitchFamily="34" charset="0"/>
-                </a:defRPr>
-              </a:lvl1pPr>
-              <a:lvl2pPr marL="742950" indent="-285750">
-                <a:defRPr>
-                  <a:solidFill>
-                    <a:schemeClr val="tx1"/>
-                  </a:solidFill>
-                  <a:latin typeface="Calibri" panose="020F0502020204030204" pitchFamily="34" charset="0"/>
-                </a:defRPr>
-              </a:lvl2pPr>
-              <a:lvl3pPr marL="1143000" indent="-228600">
-                <a:defRPr>
-                  <a:solidFill>
-                    <a:schemeClr val="tx1"/>
-                  </a:solidFill>
-                  <a:latin typeface="Calibri" panose="020F0502020204030204" pitchFamily="34" charset="0"/>
-                </a:defRPr>
-              </a:lvl3pPr>
-              <a:lvl4pPr marL="1600200" indent="-228600">
-                <a:defRPr>
-                  <a:solidFill>
-                    <a:schemeClr val="tx1"/>
-                  </a:solidFill>
-                  <a:latin typeface="Calibri" panose="020F0502020204030204" pitchFamily="34" charset="0"/>
-                </a:defRPr>
-              </a:lvl4pPr>
-              <a:lvl5pPr marL="2057400" indent="-228600">
-                <a:defRPr>
-                  <a:solidFill>
-                    <a:schemeClr val="tx1"/>
-                  </a:solidFill>
-                  <a:latin typeface="Calibri" panose="020F0502020204030204" pitchFamily="34" charset="0"/>
-                </a:defRPr>
-              </a:lvl5pPr>
-              <a:lvl6pPr marL="2514600" indent="-228600" eaLnBrk="0" fontAlgn="base" hangingPunct="0">
-                <a:spcBef>
-                  <a:spcPct val="0"/>
-                </a:spcBef>
-                <a:spcAft>
-                  <a:spcPct val="0"/>
-                </a:spcAft>
-                <a:defRPr>
-                  <a:solidFill>
-                    <a:schemeClr val="tx1"/>
-                  </a:solidFill>
-                  <a:latin typeface="Calibri" panose="020F0502020204030204" pitchFamily="34" charset="0"/>
-                </a:defRPr>
-              </a:lvl6pPr>
-              <a:lvl7pPr marL="2971800" indent="-228600" eaLnBrk="0" fontAlgn="base" hangingPunct="0">
-                <a:spcBef>
-                  <a:spcPct val="0"/>
-                </a:spcBef>
-                <a:spcAft>
-                  <a:spcPct val="0"/>
-                </a:spcAft>
-                <a:defRPr>
-                  <a:solidFill>
-                    <a:schemeClr val="tx1"/>
-                  </a:solidFill>
-                  <a:latin typeface="Calibri" panose="020F0502020204030204" pitchFamily="34" charset="0"/>
-                </a:defRPr>
-              </a:lvl7pPr>
-              <a:lvl8pPr marL="3429000" indent="-228600" eaLnBrk="0" fontAlgn="base" hangingPunct="0">
-                <a:spcBef>
-                  <a:spcPct val="0"/>
-                </a:spcBef>
-                <a:spcAft>
-                  <a:spcPct val="0"/>
-                </a:spcAft>
-                <a:defRPr>
-                  <a:solidFill>
-                    <a:schemeClr val="tx1"/>
-                  </a:solidFill>
-                  <a:latin typeface="Calibri" panose="020F0502020204030204" pitchFamily="34" charset="0"/>
-                </a:defRPr>
-              </a:lvl8pPr>
-              <a:lvl9pPr marL="3886200" indent="-228600" eaLnBrk="0" fontAlgn="base" hangingPunct="0">
-                <a:spcBef>
-                  <a:spcPct val="0"/>
-                </a:spcBef>
-                <a:spcAft>
-                  <a:spcPct val="0"/>
-                </a:spcAft>
-                <a:defRPr>
-                  <a:solidFill>
-                    <a:schemeClr val="tx1"/>
-                  </a:solidFill>
-                  <a:latin typeface="Calibri" panose="020F0502020204030204" pitchFamily="34" charset="0"/>
-                </a:defRPr>
-              </a:lvl9pPr>
-            </a:lstStyle>
-            <a:p>
-              <a:pPr algn="ctr" eaLnBrk="1" hangingPunct="1"/>
-              <a:r>
-                <a:rPr lang="en-US" altLang="en-US" sz="1200" dirty="0">
-                  <a:latin typeface="Arial" panose="020B0604020202020204" pitchFamily="34" charset="0"/>
-                  <a:ea typeface="Amazon Ember" panose="020B0603020204020204" pitchFamily="34" charset="0"/>
-                  <a:cs typeface="Arial" panose="020B0604020202020204" pitchFamily="34" charset="0"/>
-                </a:rPr>
-                <a:t>AWS Lambda</a:t>
-              </a:r>
-            </a:p>
-          </p:txBody>
-        </p:sp>
-        <p:cxnSp>
-          <p:nvCxnSpPr>
-            <p:cNvPr id="22" name="Straight Arrow Connector 21">
-              <a:extLst>
-                <a:ext uri="{FF2B5EF4-FFF2-40B4-BE49-F238E27FC236}">
-                  <a16:creationId xmlns:a16="http://schemas.microsoft.com/office/drawing/2014/main" id="{5A9D33BB-F7AF-C044-9BA5-6F98953C5C41}"/>
-                </a:ext>
-              </a:extLst>
-            </p:cNvPr>
-            <p:cNvCxnSpPr>
-              <a:stCxn id="12" idx="0"/>
-              <a:endCxn id="10" idx="2"/>
-            </p:cNvCxnSpPr>
-            <p:nvPr/>
-          </p:nvCxnSpPr>
-          <p:spPr>
-            <a:xfrm flipV="1">
-              <a:off x="5480053" y="3075610"/>
-              <a:ext cx="1" cy="500935"/>
-            </a:xfrm>
-            <a:prstGeom prst="straightConnector1">
-              <a:avLst/>
-            </a:prstGeom>
-            <a:ln w="12700">
-              <a:solidFill>
-                <a:schemeClr val="tx2"/>
-              </a:solidFill>
-              <a:headEnd type="arrow" w="med" len="sm"/>
-              <a:tailEnd type="none" w="med" len="sm"/>
-            </a:ln>
-          </p:spPr>
-          <p:style>
-            <a:lnRef idx="1">
-              <a:schemeClr val="accent1"/>
-            </a:lnRef>
-            <a:fillRef idx="0">
-              <a:schemeClr val="accent1"/>
-            </a:fillRef>
-            <a:effectRef idx="0">
-              <a:schemeClr val="accent1"/>
-            </a:effectRef>
-            <a:fontRef idx="minor">
-              <a:schemeClr val="tx1"/>
-            </a:fontRef>
-          </p:style>
-        </p:cxnSp>
-      </p:grpSp>
+          </p:cNvPr>
+          <p:cNvPicPr>
+            <a:picLocks noChangeAspect="1" noChangeArrowheads="1"/>
+          </p:cNvPicPr>
+          <p:nvPr/>
+        </p:nvPicPr>
+        <p:blipFill>
+          <a:blip r:embed="rId15" cstate="print">
+            <a:extLst>
+              <a:ext uri="{28A0092B-C50C-407E-A947-70E740481C1C}">
+                <a14:useLocalDpi xmlns:a14="http://schemas.microsoft.com/office/drawing/2010/main" val="0"/>
+              </a:ext>
+            </a:extLst>
+          </a:blip>
+          <a:srcRect/>
+          <a:stretch>
+            <a:fillRect/>
+          </a:stretch>
+        </p:blipFill>
+        <p:spPr bwMode="auto">
+          <a:xfrm>
+            <a:off x="5099053" y="3576545"/>
+            <a:ext cx="762000" cy="762000"/>
+          </a:xfrm>
+          <a:prstGeom prst="rect">
+            <a:avLst/>
+          </a:prstGeom>
+          <a:noFill/>
+          <a:ln>
+            <a:noFill/>
+          </a:ln>
+          <a:extLst>
+            <a:ext uri="{909E8E84-426E-40DD-AFC4-6F175D3DCCD1}">
+              <a14:hiddenFill xmlns:a14="http://schemas.microsoft.com/office/drawing/2010/main">
+                <a:solidFill>
+                  <a:srgbClr val="FFFFFF"/>
+                </a:solidFill>
+              </a14:hiddenFill>
+            </a:ext>
+            <a:ext uri="{91240B29-F687-4F45-9708-019B960494DF}">
+              <a14:hiddenLine xmlns:a14="http://schemas.microsoft.com/office/drawing/2010/main" w="9525">
+                <a:solidFill>
+                  <a:srgbClr val="000000"/>
+                </a:solidFill>
+                <a:miter lim="800000"/>
+                <a:headEnd/>
+                <a:tailEnd/>
+              </a14:hiddenLine>
+            </a:ext>
+          </a:extLst>
+        </p:spPr>
+      </p:pic>
+      <p:sp>
+        <p:nvSpPr>
+          <p:cNvPr id="13" name="TextBox 20">
+            <a:extLst>
+              <a:ext uri="{FF2B5EF4-FFF2-40B4-BE49-F238E27FC236}">
+                <a16:creationId xmlns:a16="http://schemas.microsoft.com/office/drawing/2014/main" id="{E5D4A7D0-5E44-1943-968A-C198F40D0E71}"/>
+              </a:ext>
+            </a:extLst>
+          </p:cNvPr>
+          <p:cNvSpPr txBox="1">
+            <a:spLocks noChangeArrowheads="1"/>
+          </p:cNvSpPr>
+          <p:nvPr/>
+        </p:nvSpPr>
+        <p:spPr bwMode="auto">
+          <a:xfrm>
+            <a:off x="4333878" y="4365705"/>
+            <a:ext cx="2292350" cy="276999"/>
+          </a:xfrm>
+          <a:prstGeom prst="rect">
+            <a:avLst/>
+          </a:prstGeom>
+          <a:noFill/>
+          <a:ln>
+            <a:noFill/>
+          </a:ln>
+          <a:extLst>
+            <a:ext uri="{909E8E84-426E-40DD-AFC4-6F175D3DCCD1}">
+              <a14:hiddenFill xmlns:a14="http://schemas.microsoft.com/office/drawing/2010/main">
+                <a:solidFill>
+                  <a:srgbClr val="FFFFFF"/>
+                </a:solidFill>
+              </a14:hiddenFill>
+            </a:ext>
+            <a:ext uri="{91240B29-F687-4F45-9708-019B960494DF}">
+              <a14:hiddenLine xmlns:a14="http://schemas.microsoft.com/office/drawing/2010/main" w="9525">
+                <a:solidFill>
+                  <a:srgbClr val="000000"/>
+                </a:solidFill>
+                <a:miter lim="800000"/>
+                <a:headEnd/>
+                <a:tailEnd/>
+              </a14:hiddenLine>
+            </a:ext>
+          </a:extLst>
+        </p:spPr>
+        <p:txBody>
+          <a:bodyPr>
+            <a:spAutoFit/>
+          </a:bodyPr>
+          <a:lstStyle>
+            <a:lvl1pPr>
+              <a:defRPr>
+                <a:solidFill>
+                  <a:schemeClr val="tx1"/>
+                </a:solidFill>
+                <a:latin typeface="Calibri" panose="020F0502020204030204" pitchFamily="34" charset="0"/>
+              </a:defRPr>
+            </a:lvl1pPr>
+            <a:lvl2pPr marL="742950" indent="-285750">
+              <a:defRPr>
+                <a:solidFill>
+                  <a:schemeClr val="tx1"/>
+                </a:solidFill>
+                <a:latin typeface="Calibri" panose="020F0502020204030204" pitchFamily="34" charset="0"/>
+              </a:defRPr>
+            </a:lvl2pPr>
+            <a:lvl3pPr marL="1143000" indent="-228600">
+              <a:defRPr>
+                <a:solidFill>
+                  <a:schemeClr val="tx1"/>
+                </a:solidFill>
+                <a:latin typeface="Calibri" panose="020F0502020204030204" pitchFamily="34" charset="0"/>
+              </a:defRPr>
+            </a:lvl3pPr>
+            <a:lvl4pPr marL="1600200" indent="-228600">
+              <a:defRPr>
+                <a:solidFill>
+                  <a:schemeClr val="tx1"/>
+                </a:solidFill>
+                <a:latin typeface="Calibri" panose="020F0502020204030204" pitchFamily="34" charset="0"/>
+              </a:defRPr>
+            </a:lvl4pPr>
+            <a:lvl5pPr marL="2057400" indent="-228600">
+              <a:defRPr>
+                <a:solidFill>
+                  <a:schemeClr val="tx1"/>
+                </a:solidFill>
+                <a:latin typeface="Calibri" panose="020F0502020204030204" pitchFamily="34" charset="0"/>
+              </a:defRPr>
+            </a:lvl5pPr>
+            <a:lvl6pPr marL="2514600" indent="-228600" eaLnBrk="0" fontAlgn="base" hangingPunct="0">
+              <a:spcBef>
+                <a:spcPct val="0"/>
+              </a:spcBef>
+              <a:spcAft>
+                <a:spcPct val="0"/>
+              </a:spcAft>
+              <a:defRPr>
+                <a:solidFill>
+                  <a:schemeClr val="tx1"/>
+                </a:solidFill>
+                <a:latin typeface="Calibri" panose="020F0502020204030204" pitchFamily="34" charset="0"/>
+              </a:defRPr>
+            </a:lvl6pPr>
+            <a:lvl7pPr marL="2971800" indent="-228600" eaLnBrk="0" fontAlgn="base" hangingPunct="0">
+              <a:spcBef>
+                <a:spcPct val="0"/>
+              </a:spcBef>
+              <a:spcAft>
+                <a:spcPct val="0"/>
+              </a:spcAft>
+              <a:defRPr>
+                <a:solidFill>
+                  <a:schemeClr val="tx1"/>
+                </a:solidFill>
+                <a:latin typeface="Calibri" panose="020F0502020204030204" pitchFamily="34" charset="0"/>
+              </a:defRPr>
+            </a:lvl7pPr>
+            <a:lvl8pPr marL="3429000" indent="-228600" eaLnBrk="0" fontAlgn="base" hangingPunct="0">
+              <a:spcBef>
+                <a:spcPct val="0"/>
+              </a:spcBef>
+              <a:spcAft>
+                <a:spcPct val="0"/>
+              </a:spcAft>
+              <a:defRPr>
+                <a:solidFill>
+                  <a:schemeClr val="tx1"/>
+                </a:solidFill>
+                <a:latin typeface="Calibri" panose="020F0502020204030204" pitchFamily="34" charset="0"/>
+              </a:defRPr>
+            </a:lvl8pPr>
+            <a:lvl9pPr marL="3886200" indent="-228600" eaLnBrk="0" fontAlgn="base" hangingPunct="0">
+              <a:spcBef>
+                <a:spcPct val="0"/>
+              </a:spcBef>
+              <a:spcAft>
+                <a:spcPct val="0"/>
+              </a:spcAft>
+              <a:defRPr>
+                <a:solidFill>
+                  <a:schemeClr val="tx1"/>
+                </a:solidFill>
+                <a:latin typeface="Calibri" panose="020F0502020204030204" pitchFamily="34" charset="0"/>
+              </a:defRPr>
+            </a:lvl9pPr>
+          </a:lstStyle>
+          <a:p>
+            <a:pPr algn="ctr" eaLnBrk="1" hangingPunct="1"/>
+            <a:r>
+              <a:rPr lang="en-US" altLang="en-US" sz="1200" dirty="0">
+                <a:latin typeface="Arial" panose="020B0604020202020204" pitchFamily="34" charset="0"/>
+                <a:ea typeface="Amazon Ember" panose="020B0603020204020204" pitchFamily="34" charset="0"/>
+                <a:cs typeface="Arial" panose="020B0604020202020204" pitchFamily="34" charset="0"/>
+              </a:rPr>
+              <a:t>AWS Lambda</a:t>
+            </a:r>
+          </a:p>
+        </p:txBody>
+      </p:sp>
+      <p:cxnSp>
+        <p:nvCxnSpPr>
+          <p:cNvPr id="22" name="Straight Arrow Connector 21">
+            <a:extLst>
+              <a:ext uri="{FF2B5EF4-FFF2-40B4-BE49-F238E27FC236}">
+                <a16:creationId xmlns:a16="http://schemas.microsoft.com/office/drawing/2014/main" id="{5A9D33BB-F7AF-C044-9BA5-6F98953C5C41}"/>
+              </a:ext>
+            </a:extLst>
+          </p:cNvPr>
+          <p:cNvCxnSpPr>
+            <a:stCxn id="12" idx="0"/>
+            <a:endCxn id="10" idx="2"/>
+          </p:cNvCxnSpPr>
+          <p:nvPr/>
+        </p:nvCxnSpPr>
+        <p:spPr>
+          <a:xfrm flipV="1">
+            <a:off x="5480053" y="3075610"/>
+            <a:ext cx="1" cy="500935"/>
+          </a:xfrm>
+          <a:prstGeom prst="straightConnector1">
+            <a:avLst/>
+          </a:prstGeom>
+          <a:ln w="12700">
+            <a:solidFill>
+              <a:schemeClr val="tx2"/>
+            </a:solidFill>
+            <a:headEnd type="arrow" w="med" len="sm"/>
+            <a:tailEnd type="none" w="med" len="sm"/>
+          </a:ln>
+        </p:spPr>
+        <p:style>
+          <a:lnRef idx="1">
+            <a:schemeClr val="accent1"/>
+          </a:lnRef>
+          <a:fillRef idx="0">
+            <a:schemeClr val="accent1"/>
+          </a:fillRef>
+          <a:effectRef idx="0">
+            <a:schemeClr val="accent1"/>
+          </a:effectRef>
+          <a:fontRef idx="minor">
+            <a:schemeClr val="tx1"/>
+          </a:fontRef>
+        </p:style>
+      </p:cxnSp>
+      <p:pic>
+        <p:nvPicPr>
+          <p:cNvPr id="16" name="Graphic 22">
+            <a:extLst>
+              <a:ext uri="{FF2B5EF4-FFF2-40B4-BE49-F238E27FC236}">
+                <a16:creationId xmlns:a16="http://schemas.microsoft.com/office/drawing/2014/main" id="{8ABF4DC3-21DD-F148-976A-E2C78367A386}"/>
+              </a:ext>
+            </a:extLst>
+          </p:cNvPr>
+          <p:cNvPicPr>
+            <a:picLocks noChangeAspect="1" noChangeArrowheads="1"/>
+          </p:cNvPicPr>
+          <p:nvPr/>
+        </p:nvPicPr>
+        <p:blipFill>
+          <a:blip r:embed="rId16">
+            <a:extLst>
+              <a:ext uri="{96DAC541-7B7A-43D3-8B79-37D633B846F1}">
+                <asvg:svgBlip xmlns:asvg="http://schemas.microsoft.com/office/drawing/2016/SVG/main" xmlns="" r:embed="rId20"/>
+              </a:ext>
+            </a:extLst>
+          </a:blip>
+          <a:srcRect/>
+          <a:stretch/>
+        </p:blipFill>
+        <p:spPr bwMode="auto">
+          <a:xfrm>
+            <a:off x="3683930" y="3722595"/>
+            <a:ext cx="469900" cy="469900"/>
+          </a:xfrm>
+          <a:prstGeom prst="rect">
+            <a:avLst/>
+          </a:prstGeom>
+          <a:noFill/>
+          <a:ln>
+            <a:noFill/>
+          </a:ln>
+          <a:extLst>
+            <a:ext uri="{909E8E84-426E-40DD-AFC4-6F175D3DCCD1}">
+              <a14:hiddenFill xmlns:a14="http://schemas.microsoft.com/office/drawing/2010/main">
+                <a:solidFill>
+                  <a:srgbClr val="FFFFFF"/>
+                </a:solidFill>
+              </a14:hiddenFill>
+            </a:ext>
+            <a:ext uri="{91240B29-F687-4F45-9708-019B960494DF}">
+              <a14:hiddenLine xmlns:a14="http://schemas.microsoft.com/office/drawing/2010/main" w="9525">
+                <a:solidFill>
+                  <a:srgbClr val="000000"/>
+                </a:solidFill>
+                <a:miter lim="800000"/>
+                <a:headEnd/>
+                <a:tailEnd/>
+              </a14:hiddenLine>
+            </a:ext>
+          </a:extLst>
+        </p:spPr>
+      </p:pic>
+      <p:sp>
+        <p:nvSpPr>
+          <p:cNvPr id="17" name="TextBox 39">
+            <a:extLst>
+              <a:ext uri="{FF2B5EF4-FFF2-40B4-BE49-F238E27FC236}">
+                <a16:creationId xmlns:a16="http://schemas.microsoft.com/office/drawing/2014/main" id="{AC9D78F5-1A22-844B-8801-818696526725}"/>
+              </a:ext>
+            </a:extLst>
+          </p:cNvPr>
+          <p:cNvSpPr txBox="1">
+            <a:spLocks noChangeArrowheads="1"/>
+          </p:cNvSpPr>
+          <p:nvPr/>
+        </p:nvSpPr>
+        <p:spPr bwMode="auto">
+          <a:xfrm>
+            <a:off x="3382305" y="4381094"/>
+            <a:ext cx="1073150" cy="261610"/>
+          </a:xfrm>
+          <a:prstGeom prst="rect">
+            <a:avLst/>
+          </a:prstGeom>
+          <a:noFill/>
+          <a:ln>
+            <a:noFill/>
+          </a:ln>
+          <a:extLst>
+            <a:ext uri="{909E8E84-426E-40DD-AFC4-6F175D3DCCD1}">
+              <a14:hiddenFill xmlns:a14="http://schemas.microsoft.com/office/drawing/2010/main">
+                <a:solidFill>
+                  <a:srgbClr val="FFFFFF"/>
+                </a:solidFill>
+              </a14:hiddenFill>
+            </a:ext>
+            <a:ext uri="{91240B29-F687-4F45-9708-019B960494DF}">
+              <a14:hiddenLine xmlns:a14="http://schemas.microsoft.com/office/drawing/2010/main" w="9525">
+                <a:solidFill>
+                  <a:srgbClr val="000000"/>
+                </a:solidFill>
+                <a:miter lim="800000"/>
+                <a:headEnd/>
+                <a:tailEnd/>
+              </a14:hiddenLine>
+            </a:ext>
+          </a:extLst>
+        </p:spPr>
+        <p:txBody>
+          <a:bodyPr>
+            <a:spAutoFit/>
+          </a:bodyPr>
+          <a:lstStyle>
+            <a:lvl1pPr>
+              <a:defRPr>
+                <a:solidFill>
+                  <a:schemeClr val="tx1"/>
+                </a:solidFill>
+                <a:latin typeface="Calibri" panose="020F0502020204030204" pitchFamily="34" charset="0"/>
+              </a:defRPr>
+            </a:lvl1pPr>
+            <a:lvl2pPr marL="742950" indent="-285750">
+              <a:defRPr>
+                <a:solidFill>
+                  <a:schemeClr val="tx1"/>
+                </a:solidFill>
+                <a:latin typeface="Calibri" panose="020F0502020204030204" pitchFamily="34" charset="0"/>
+              </a:defRPr>
+            </a:lvl2pPr>
+            <a:lvl3pPr marL="1143000" indent="-228600">
+              <a:defRPr>
+                <a:solidFill>
+                  <a:schemeClr val="tx1"/>
+                </a:solidFill>
+                <a:latin typeface="Calibri" panose="020F0502020204030204" pitchFamily="34" charset="0"/>
+              </a:defRPr>
+            </a:lvl3pPr>
+            <a:lvl4pPr marL="1600200" indent="-228600">
+              <a:defRPr>
+                <a:solidFill>
+                  <a:schemeClr val="tx1"/>
+                </a:solidFill>
+                <a:latin typeface="Calibri" panose="020F0502020204030204" pitchFamily="34" charset="0"/>
+              </a:defRPr>
+            </a:lvl4pPr>
+            <a:lvl5pPr marL="2057400" indent="-228600">
+              <a:defRPr>
+                <a:solidFill>
+                  <a:schemeClr val="tx1"/>
+                </a:solidFill>
+                <a:latin typeface="Calibri" panose="020F0502020204030204" pitchFamily="34" charset="0"/>
+              </a:defRPr>
+            </a:lvl5pPr>
+            <a:lvl6pPr marL="2514600" indent="-228600" eaLnBrk="0" fontAlgn="base" hangingPunct="0">
+              <a:spcBef>
+                <a:spcPct val="0"/>
+              </a:spcBef>
+              <a:spcAft>
+                <a:spcPct val="0"/>
+              </a:spcAft>
+              <a:defRPr>
+                <a:solidFill>
+                  <a:schemeClr val="tx1"/>
+                </a:solidFill>
+                <a:latin typeface="Calibri" panose="020F0502020204030204" pitchFamily="34" charset="0"/>
+              </a:defRPr>
+            </a:lvl6pPr>
+            <a:lvl7pPr marL="2971800" indent="-228600" eaLnBrk="0" fontAlgn="base" hangingPunct="0">
+              <a:spcBef>
+                <a:spcPct val="0"/>
+              </a:spcBef>
+              <a:spcAft>
+                <a:spcPct val="0"/>
+              </a:spcAft>
+              <a:defRPr>
+                <a:solidFill>
+                  <a:schemeClr val="tx1"/>
+                </a:solidFill>
+                <a:latin typeface="Calibri" panose="020F0502020204030204" pitchFamily="34" charset="0"/>
+              </a:defRPr>
+            </a:lvl7pPr>
+            <a:lvl8pPr marL="3429000" indent="-228600" eaLnBrk="0" fontAlgn="base" hangingPunct="0">
+              <a:spcBef>
+                <a:spcPct val="0"/>
+              </a:spcBef>
+              <a:spcAft>
+                <a:spcPct val="0"/>
+              </a:spcAft>
+              <a:defRPr>
+                <a:solidFill>
+                  <a:schemeClr val="tx1"/>
+                </a:solidFill>
+                <a:latin typeface="Calibri" panose="020F0502020204030204" pitchFamily="34" charset="0"/>
+              </a:defRPr>
+            </a:lvl8pPr>
+            <a:lvl9pPr marL="3886200" indent="-228600" eaLnBrk="0" fontAlgn="base" hangingPunct="0">
+              <a:spcBef>
+                <a:spcPct val="0"/>
+              </a:spcBef>
+              <a:spcAft>
+                <a:spcPct val="0"/>
+              </a:spcAft>
+              <a:defRPr>
+                <a:solidFill>
+                  <a:schemeClr val="tx1"/>
+                </a:solidFill>
+                <a:latin typeface="Calibri" panose="020F0502020204030204" pitchFamily="34" charset="0"/>
+              </a:defRPr>
+            </a:lvl9pPr>
+          </a:lstStyle>
+          <a:p>
+            <a:pPr algn="ctr" eaLnBrk="1" hangingPunct="1"/>
+            <a:r>
+              <a:rPr lang="en-US" altLang="en-US" sz="1100" dirty="0">
+                <a:solidFill>
+                  <a:srgbClr val="000000"/>
+                </a:solidFill>
+                <a:latin typeface="Arial" panose="020B0604020202020204" pitchFamily="34" charset="0"/>
+                <a:cs typeface="Arial" panose="020B0604020202020204" pitchFamily="34" charset="0"/>
+              </a:rPr>
+              <a:t>User</a:t>
+            </a:r>
+          </a:p>
+        </p:txBody>
+      </p:sp>
+      <p:cxnSp>
+        <p:nvCxnSpPr>
+          <p:cNvPr id="18" name="Straight Arrow Connector 17">
+            <a:extLst>
+              <a:ext uri="{FF2B5EF4-FFF2-40B4-BE49-F238E27FC236}">
+                <a16:creationId xmlns:a16="http://schemas.microsoft.com/office/drawing/2014/main" id="{9E8BEF15-E8C4-2242-949A-672EF8C74E91}"/>
+              </a:ext>
+            </a:extLst>
+          </p:cNvPr>
+          <p:cNvCxnSpPr>
+            <a:cxnSpLocks/>
+            <a:stCxn id="16" idx="3"/>
+            <a:endCxn id="12" idx="1"/>
+          </p:cNvCxnSpPr>
+          <p:nvPr/>
+        </p:nvCxnSpPr>
+        <p:spPr>
+          <a:xfrm>
+            <a:off x="4153830" y="3957545"/>
+            <a:ext cx="945223" cy="0"/>
+          </a:xfrm>
+          <a:prstGeom prst="straightConnector1">
+            <a:avLst/>
+          </a:prstGeom>
+          <a:ln w="12700">
+            <a:solidFill>
+              <a:srgbClr val="545B64"/>
+            </a:solidFill>
+            <a:headEnd type="none" w="med" len="sm"/>
+            <a:tailEnd type="arrow" w="med" len="sm"/>
+          </a:ln>
+        </p:spPr>
+        <p:style>
+          <a:lnRef idx="1">
+            <a:schemeClr val="accent1"/>
+          </a:lnRef>
+          <a:fillRef idx="0">
+            <a:schemeClr val="accent1"/>
+          </a:fillRef>
+          <a:effectRef idx="0">
+            <a:schemeClr val="accent1"/>
+          </a:effectRef>
+          <a:fontRef idx="minor">
+            <a:schemeClr val="tx1"/>
+          </a:fontRef>
+        </p:style>
+      </p:cxnSp>
     </p:spTree>
     <p:extLst>
       <p:ext uri="{BB962C8B-B14F-4D97-AF65-F5344CB8AC3E}">

</xml_diff>